<commit_message>
Novos exemplos, exercicios, apresentacao
</commit_message>
<xml_diff>
--- a/Documentos/Orientação a Objetos.pptx
+++ b/Documentos/Orientação a Objetos.pptx
@@ -5,7 +5,7 @@
     <p:sldMasterId id="2147483802" r:id="rId1"/>
   </p:sldMasterIdLst>
   <p:notesMasterIdLst>
-    <p:notesMasterId r:id="rId25"/>
+    <p:notesMasterId r:id="rId38"/>
   </p:notesMasterIdLst>
   <p:sldIdLst>
     <p:sldId id="256" r:id="rId2"/>
@@ -31,6 +31,19 @@
     <p:sldId id="327" r:id="rId22"/>
     <p:sldId id="328" r:id="rId23"/>
     <p:sldId id="329" r:id="rId24"/>
+    <p:sldId id="330" r:id="rId25"/>
+    <p:sldId id="331" r:id="rId26"/>
+    <p:sldId id="332" r:id="rId27"/>
+    <p:sldId id="333" r:id="rId28"/>
+    <p:sldId id="334" r:id="rId29"/>
+    <p:sldId id="335" r:id="rId30"/>
+    <p:sldId id="336" r:id="rId31"/>
+    <p:sldId id="337" r:id="rId32"/>
+    <p:sldId id="338" r:id="rId33"/>
+    <p:sldId id="339" r:id="rId34"/>
+    <p:sldId id="340" r:id="rId35"/>
+    <p:sldId id="341" r:id="rId36"/>
+    <p:sldId id="342" r:id="rId37"/>
   </p:sldIdLst>
   <p:sldSz cx="9144000" cy="6858000" type="screen4x3"/>
   <p:notesSz cx="6858000" cy="9144000"/>
@@ -214,7 +227,7 @@
           <a:p>
             <a:fld id="{E2B913E8-0330-B643-A20B-1A6E83DAE541}" type="datetimeFigureOut">
               <a:rPr lang="en-US" smtClean="0"/>
-              <a:t>23/11/14</a:t>
+              <a:t>24/11/14</a:t>
             </a:fld>
             <a:endParaRPr lang="en-US"/>
           </a:p>
@@ -764,7 +777,7 @@
             <a:fld id="{9EB5ECD5-515E-4817-8A06-1D2ED2C83850}" type="datetime4">
               <a:rPr lang="en-US" smtClean="0"/>
               <a:pPr/>
-              <a:t>November 23, 2014</a:t>
+              <a:t>November 24, 2014</a:t>
             </a:fld>
             <a:endParaRPr lang="en-US"/>
           </a:p>
@@ -936,7 +949,7 @@
             <a:fld id="{BA5B59F4-DDCB-41FF-83F5-A48440F36FA7}" type="datetime4">
               <a:rPr lang="en-US" smtClean="0"/>
               <a:pPr/>
-              <a:t>November 23, 2014</a:t>
+              <a:t>November 24, 2014</a:t>
             </a:fld>
             <a:endParaRPr lang="en-US"/>
           </a:p>
@@ -2056,7 +2069,7 @@
             <a:fld id="{48056348-D703-428C-A1C4-7D6796EF5F41}" type="datetime4">
               <a:rPr lang="en-US" smtClean="0"/>
               <a:pPr/>
-              <a:t>November 23, 2014</a:t>
+              <a:t>November 24, 2014</a:t>
             </a:fld>
             <a:endParaRPr lang="en-US"/>
           </a:p>
@@ -3166,7 +3179,7 @@
             <a:fld id="{732D1919-1B5F-4141-B613-3E5C6008A186}" type="datetime4">
               <a:rPr lang="en-US" smtClean="0"/>
               <a:pPr/>
-              <a:t>November 23, 2014</a:t>
+              <a:t>November 24, 2014</a:t>
             </a:fld>
             <a:endParaRPr lang="en-US"/>
           </a:p>
@@ -3414,7 +3427,7 @@
             <a:fld id="{BAD22427-B1DD-49E6-9F05-DE0F1467D7DC}" type="datetime4">
               <a:rPr lang="en-US" smtClean="0"/>
               <a:pPr/>
-              <a:t>November 23, 2014</a:t>
+              <a:t>November 24, 2014</a:t>
             </a:fld>
             <a:endParaRPr lang="en-US"/>
           </a:p>
@@ -3704,7 +3717,7 @@
             <a:fld id="{BBCCA7B5-8BC9-491C-A887-7C3E7ED947D8}" type="datetime4">
               <a:rPr lang="en-US" smtClean="0"/>
               <a:pPr/>
-              <a:t>November 23, 2014</a:t>
+              <a:t>November 24, 2014</a:t>
             </a:fld>
             <a:endParaRPr lang="en-US"/>
           </a:p>
@@ -4128,7 +4141,7 @@
             <a:fld id="{BDA18ED0-40F2-434C-A848-B92581875164}" type="datetime4">
               <a:rPr lang="en-US" smtClean="0"/>
               <a:pPr/>
-              <a:t>November 23, 2014</a:t>
+              <a:t>November 24, 2014</a:t>
             </a:fld>
             <a:endParaRPr lang="en-US"/>
           </a:p>
@@ -4248,7 +4261,7 @@
             <a:fld id="{7855437F-F4F9-44A9-B4D3-9191CA04E889}" type="datetime4">
               <a:rPr lang="en-US" smtClean="0"/>
               <a:pPr/>
-              <a:t>November 23, 2014</a:t>
+              <a:t>November 24, 2014</a:t>
             </a:fld>
             <a:endParaRPr lang="en-US"/>
           </a:p>
@@ -4345,7 +4358,7 @@
             <a:fld id="{39A24E59-01D0-4537-B876-7E5EC75B028D}" type="datetime4">
               <a:rPr lang="en-US" smtClean="0"/>
               <a:pPr/>
-              <a:t>November 23, 2014</a:t>
+              <a:t>November 24, 2014</a:t>
             </a:fld>
             <a:endParaRPr lang="en-US"/>
           </a:p>
@@ -4624,7 +4637,7 @@
             <a:fld id="{655A2E49-18A1-40BC-BA5D-5A2EC8FDDF15}" type="datetime4">
               <a:rPr lang="en-US" smtClean="0"/>
               <a:pPr/>
-              <a:t>November 23, 2014</a:t>
+              <a:t>November 24, 2014</a:t>
             </a:fld>
             <a:endParaRPr lang="en-US"/>
           </a:p>
@@ -4879,7 +4892,7 @@
             <a:fld id="{52983DA4-3B24-449B-95CA-514EB7E30A99}" type="datetime4">
               <a:rPr lang="en-US" smtClean="0"/>
               <a:pPr/>
-              <a:t>November 23, 2014</a:t>
+              <a:t>November 24, 2014</a:t>
             </a:fld>
             <a:endParaRPr lang="en-US"/>
           </a:p>
@@ -5094,7 +5107,7 @@
             <a:fld id="{942120D2-3948-4F8F-BE5D-E7E7D97880B2}" type="datetime4">
               <a:rPr lang="en-US" smtClean="0"/>
               <a:pPr/>
-              <a:t>November 23, 2014</a:t>
+              <a:t>November 24, 2014</a:t>
             </a:fld>
             <a:endParaRPr lang="en-US" dirty="0" err="1"/>
           </a:p>
@@ -8407,11 +8420,7 @@
           <a:p>
             <a:r>
               <a:rPr lang="en-US" dirty="0" err="1" smtClean="0"/>
-              <a:t>Aloca</a:t>
-            </a:r>
-            <a:r>
-              <a:rPr lang="en-US" dirty="0" err="1" smtClean="0"/>
-              <a:t>ção</a:t>
+              <a:t>Alocação</a:t>
             </a:r>
             <a:r>
               <a:rPr lang="en-US" dirty="0" smtClean="0"/>
@@ -8466,11 +8475,7 @@
             </a:r>
             <a:r>
               <a:rPr lang="en-US" dirty="0" err="1" smtClean="0"/>
-              <a:t>vari</a:t>
-            </a:r>
-            <a:r>
-              <a:rPr lang="en-US" dirty="0" err="1" smtClean="0"/>
-              <a:t>ável</a:t>
+              <a:t>variável</a:t>
             </a:r>
             <a:r>
               <a:rPr lang="en-US" dirty="0" smtClean="0"/>
@@ -8803,11 +8808,7 @@
           <a:p>
             <a:r>
               <a:rPr lang="en-US" dirty="0" err="1" smtClean="0"/>
-              <a:t>Aloca</a:t>
-            </a:r>
-            <a:r>
-              <a:rPr lang="en-US" dirty="0" err="1" smtClean="0"/>
-              <a:t>ção</a:t>
+              <a:t>Alocação</a:t>
             </a:r>
             <a:r>
               <a:rPr lang="en-US" dirty="0" smtClean="0"/>
@@ -8862,11 +8863,7 @@
             </a:r>
             <a:r>
               <a:rPr lang="en-US" dirty="0" err="1" smtClean="0"/>
-              <a:t>declara</a:t>
-            </a:r>
-            <a:r>
-              <a:rPr lang="en-US" dirty="0" err="1" smtClean="0"/>
-              <a:t>ção</a:t>
+              <a:t>declaração</a:t>
             </a:r>
             <a:r>
               <a:rPr lang="en-US" dirty="0" smtClean="0"/>
@@ -9515,11 +9512,7 @@
           <a:p>
             <a:r>
               <a:rPr lang="en-US" dirty="0" err="1" smtClean="0"/>
-              <a:t>Aloca</a:t>
-            </a:r>
-            <a:r>
-              <a:rPr lang="en-US" dirty="0" err="1" smtClean="0"/>
-              <a:t>ção</a:t>
+              <a:t>Alocação</a:t>
             </a:r>
             <a:r>
               <a:rPr lang="en-US" dirty="0" smtClean="0"/>
@@ -9554,11 +9547,7 @@
           <a:p>
             <a:r>
               <a:rPr lang="en-US" dirty="0" err="1" smtClean="0"/>
-              <a:t>Ap</a:t>
-            </a:r>
-            <a:r>
-              <a:rPr lang="en-US" dirty="0" err="1" smtClean="0"/>
-              <a:t>ós</a:t>
+              <a:t>Após</a:t>
             </a:r>
             <a:r>
               <a:rPr lang="en-US" dirty="0" smtClean="0"/>
@@ -10020,11 +10009,7 @@
           <a:p>
             <a:r>
               <a:rPr lang="en-US" dirty="0" err="1" smtClean="0"/>
-              <a:t>Aloca</a:t>
-            </a:r>
-            <a:r>
-              <a:rPr lang="en-US" dirty="0" err="1" smtClean="0"/>
-              <a:t>ção</a:t>
+              <a:t>Alocação</a:t>
             </a:r>
             <a:r>
               <a:rPr lang="en-US" dirty="0" smtClean="0"/>
@@ -10576,11 +10561,7 @@
           <a:p>
             <a:r>
               <a:rPr lang="en-US" dirty="0" err="1" smtClean="0"/>
-              <a:t>Atribui</a:t>
-            </a:r>
-            <a:r>
-              <a:rPr lang="en-US" dirty="0" err="1" smtClean="0"/>
-              <a:t>ção</a:t>
+              <a:t>Atribuição</a:t>
             </a:r>
             <a:r>
               <a:rPr lang="en-US" dirty="0" smtClean="0"/>
@@ -10623,11 +10604,7 @@
             </a:r>
             <a:r>
               <a:rPr lang="en-US" dirty="0" err="1" smtClean="0"/>
-              <a:t>vari</a:t>
-            </a:r>
-            <a:r>
-              <a:rPr lang="en-US" dirty="0" err="1" smtClean="0"/>
-              <a:t>áveis</a:t>
+              <a:t>variáveis</a:t>
             </a:r>
             <a:r>
               <a:rPr lang="en-US" dirty="0" smtClean="0"/>
@@ -10854,11 +10831,7 @@
           <a:p>
             <a:r>
               <a:rPr lang="en-US" dirty="0" err="1" smtClean="0"/>
-              <a:t>Atribui</a:t>
-            </a:r>
-            <a:r>
-              <a:rPr lang="en-US" dirty="0" err="1" smtClean="0"/>
-              <a:t>ção</a:t>
+              <a:t>Atribuição</a:t>
             </a:r>
             <a:r>
               <a:rPr lang="en-US" dirty="0" smtClean="0"/>
@@ -10895,11 +10868,7 @@
             </a:r>
             <a:r>
               <a:rPr lang="en-US" dirty="0" err="1" smtClean="0"/>
-              <a:t>vari</a:t>
-            </a:r>
-            <a:r>
-              <a:rPr lang="en-US" dirty="0" err="1" smtClean="0"/>
-              <a:t>áveis</a:t>
+              <a:t>variáveis</a:t>
             </a:r>
             <a:r>
               <a:rPr lang="en-US" dirty="0" smtClean="0"/>
@@ -11233,6 +11202,1245 @@
     <p:extLst>
       <p:ext uri="{BB962C8B-B14F-4D97-AF65-F5344CB8AC3E}">
         <p14:creationId xmlns:p14="http://schemas.microsoft.com/office/powerpoint/2010/main" val="1773029415"/>
+      </p:ext>
+    </p:extLst>
+  </p:cSld>
+  <p:clrMapOvr>
+    <a:masterClrMapping/>
+  </p:clrMapOvr>
+</p:sld>
+</file>
+
+<file path=ppt/slides/slide24.xml><?xml version="1.0" encoding="utf-8"?>
+<p:sld xmlns:a="http://schemas.openxmlformats.org/drawingml/2006/main" xmlns:r="http://schemas.openxmlformats.org/officeDocument/2006/relationships" xmlns:p="http://schemas.openxmlformats.org/presentationml/2006/main">
+  <p:cSld>
+    <p:spTree>
+      <p:nvGrpSpPr>
+        <p:cNvPr id="1" name=""/>
+        <p:cNvGrpSpPr/>
+        <p:nvPr/>
+      </p:nvGrpSpPr>
+      <p:grpSpPr>
+        <a:xfrm>
+          <a:off x="0" y="0"/>
+          <a:ext cx="0" cy="0"/>
+          <a:chOff x="0" y="0"/>
+          <a:chExt cx="0" cy="0"/>
+        </a:xfrm>
+      </p:grpSpPr>
+      <p:sp>
+        <p:nvSpPr>
+          <p:cNvPr id="2" name="Title 1"/>
+          <p:cNvSpPr>
+            <a:spLocks noGrp="1"/>
+          </p:cNvSpPr>
+          <p:nvPr>
+            <p:ph type="title"/>
+          </p:nvPr>
+        </p:nvSpPr>
+        <p:spPr/>
+        <p:txBody>
+          <a:bodyPr/>
+          <a:lstStyle/>
+          <a:p>
+            <a:r>
+              <a:rPr lang="en-US" dirty="0" err="1" smtClean="0"/>
+              <a:t>Passagem</a:t>
+            </a:r>
+            <a:r>
+              <a:rPr lang="en-US" dirty="0" smtClean="0"/>
+              <a:t> de Valor</a:t>
+            </a:r>
+            <a:endParaRPr lang="en-US" dirty="0"/>
+          </a:p>
+        </p:txBody>
+      </p:sp>
+      <p:sp>
+        <p:nvSpPr>
+          <p:cNvPr id="3" name="Content Placeholder 2"/>
+          <p:cNvSpPr>
+            <a:spLocks noGrp="1"/>
+          </p:cNvSpPr>
+          <p:nvPr>
+            <p:ph idx="1"/>
+          </p:nvPr>
+        </p:nvSpPr>
+        <p:spPr/>
+        <p:txBody>
+          <a:bodyPr>
+            <a:normAutofit lnSpcReduction="10000"/>
+          </a:bodyPr>
+          <a:lstStyle/>
+          <a:p>
+            <a:r>
+              <a:rPr lang="en-US" dirty="0" err="1" smtClean="0"/>
+              <a:t>Todos</a:t>
+            </a:r>
+            <a:r>
+              <a:rPr lang="en-US" dirty="0" smtClean="0"/>
+              <a:t> </a:t>
+            </a:r>
+            <a:r>
+              <a:rPr lang="en-US" dirty="0" err="1" smtClean="0"/>
+              <a:t>os</a:t>
+            </a:r>
+            <a:r>
+              <a:rPr lang="en-US" dirty="0" smtClean="0"/>
+              <a:t> </a:t>
+            </a:r>
+            <a:r>
+              <a:rPr lang="en-US" dirty="0" err="1" smtClean="0"/>
+              <a:t>argumentos</a:t>
+            </a:r>
+            <a:r>
+              <a:rPr lang="en-US" dirty="0" smtClean="0"/>
+              <a:t> </a:t>
+            </a:r>
+            <a:r>
+              <a:rPr lang="en-US" dirty="0" err="1" smtClean="0"/>
+              <a:t>em</a:t>
+            </a:r>
+            <a:r>
+              <a:rPr lang="en-US" dirty="0" smtClean="0"/>
+              <a:t> Java </a:t>
+            </a:r>
+            <a:r>
+              <a:rPr lang="en-US" dirty="0" err="1" smtClean="0"/>
+              <a:t>s</a:t>
+            </a:r>
+            <a:r>
+              <a:rPr lang="en-US" dirty="0" err="1" smtClean="0"/>
+              <a:t>ão</a:t>
+            </a:r>
+            <a:r>
+              <a:rPr lang="en-US" dirty="0" smtClean="0"/>
+              <a:t> </a:t>
+            </a:r>
+            <a:r>
+              <a:rPr lang="en-US" dirty="0" err="1" smtClean="0"/>
+              <a:t>passados</a:t>
+            </a:r>
+            <a:r>
+              <a:rPr lang="en-US" dirty="0" smtClean="0"/>
+              <a:t> </a:t>
+            </a:r>
+            <a:r>
+              <a:rPr lang="en-US" dirty="0" err="1" smtClean="0"/>
+              <a:t>por</a:t>
+            </a:r>
+            <a:r>
+              <a:rPr lang="en-US" dirty="0" smtClean="0"/>
+              <a:t> valor, </a:t>
+            </a:r>
+            <a:r>
+              <a:rPr lang="en-US" dirty="0" err="1" smtClean="0"/>
+              <a:t>ou</a:t>
+            </a:r>
+            <a:r>
+              <a:rPr lang="en-US" dirty="0" smtClean="0"/>
+              <a:t> </a:t>
+            </a:r>
+            <a:r>
+              <a:rPr lang="en-US" dirty="0" err="1" smtClean="0"/>
+              <a:t>seja</a:t>
+            </a:r>
+            <a:r>
+              <a:rPr lang="en-US" dirty="0" smtClean="0"/>
+              <a:t>, o valor original do </a:t>
+            </a:r>
+            <a:r>
+              <a:rPr lang="en-US" dirty="0" err="1" smtClean="0"/>
+              <a:t>argumento</a:t>
+            </a:r>
+            <a:r>
+              <a:rPr lang="en-US" dirty="0" smtClean="0"/>
+              <a:t> </a:t>
+            </a:r>
+            <a:r>
+              <a:rPr lang="en-US" dirty="0" err="1" smtClean="0"/>
+              <a:t>não</a:t>
+            </a:r>
+            <a:r>
+              <a:rPr lang="en-US" dirty="0" smtClean="0"/>
+              <a:t> </a:t>
+            </a:r>
+            <a:r>
+              <a:rPr lang="en-US" dirty="0" err="1" smtClean="0"/>
+              <a:t>será</a:t>
+            </a:r>
+            <a:r>
+              <a:rPr lang="en-US" dirty="0" smtClean="0"/>
+              <a:t> </a:t>
+            </a:r>
+            <a:r>
+              <a:rPr lang="en-US" dirty="0" err="1" smtClean="0"/>
+              <a:t>modificado</a:t>
+            </a:r>
+            <a:r>
+              <a:rPr lang="en-US" dirty="0" smtClean="0"/>
+              <a:t> </a:t>
+            </a:r>
+            <a:r>
+              <a:rPr lang="en-US" dirty="0" err="1" smtClean="0"/>
+              <a:t>após</a:t>
+            </a:r>
+            <a:r>
+              <a:rPr lang="en-US" dirty="0" smtClean="0"/>
+              <a:t> o </a:t>
+            </a:r>
+            <a:r>
+              <a:rPr lang="en-US" dirty="0" err="1" smtClean="0"/>
+              <a:t>retorno</a:t>
+            </a:r>
+            <a:r>
+              <a:rPr lang="en-US" dirty="0" smtClean="0"/>
+              <a:t> do </a:t>
+            </a:r>
+            <a:r>
+              <a:rPr lang="en-US" dirty="0" err="1" smtClean="0"/>
+              <a:t>método</a:t>
+            </a:r>
+            <a:r>
+              <a:rPr lang="en-US" dirty="0" smtClean="0"/>
+              <a:t>. </a:t>
+            </a:r>
+            <a:r>
+              <a:rPr lang="en-US" dirty="0" err="1" smtClean="0"/>
+              <a:t>Quando</a:t>
+            </a:r>
+            <a:r>
+              <a:rPr lang="en-US" dirty="0" smtClean="0"/>
+              <a:t> a </a:t>
+            </a:r>
+            <a:r>
+              <a:rPr lang="en-US" dirty="0" err="1" smtClean="0"/>
+              <a:t>instância</a:t>
+            </a:r>
+            <a:r>
+              <a:rPr lang="en-US" dirty="0" smtClean="0"/>
+              <a:t> de </a:t>
+            </a:r>
+            <a:r>
+              <a:rPr lang="en-US" dirty="0" err="1" smtClean="0"/>
+              <a:t>uma</a:t>
+            </a:r>
+            <a:r>
+              <a:rPr lang="en-US" dirty="0" smtClean="0"/>
+              <a:t> </a:t>
+            </a:r>
+            <a:r>
+              <a:rPr lang="en-US" dirty="0" err="1" smtClean="0"/>
+              <a:t>classe</a:t>
+            </a:r>
+            <a:r>
+              <a:rPr lang="en-US" dirty="0" smtClean="0"/>
+              <a:t> </a:t>
+            </a:r>
+            <a:r>
+              <a:rPr lang="en-US" dirty="0" err="1" smtClean="0"/>
+              <a:t>é</a:t>
+            </a:r>
+            <a:r>
+              <a:rPr lang="en-US" dirty="0" smtClean="0"/>
+              <a:t> </a:t>
+            </a:r>
+            <a:r>
+              <a:rPr lang="en-US" dirty="0" err="1" smtClean="0"/>
+              <a:t>usada</a:t>
+            </a:r>
+            <a:r>
+              <a:rPr lang="en-US" dirty="0" smtClean="0"/>
+              <a:t> </a:t>
+            </a:r>
+            <a:r>
+              <a:rPr lang="en-US" dirty="0" err="1" smtClean="0"/>
+              <a:t>como</a:t>
+            </a:r>
+            <a:r>
+              <a:rPr lang="en-US" dirty="0" smtClean="0"/>
+              <a:t> </a:t>
+            </a:r>
+            <a:r>
+              <a:rPr lang="en-US" dirty="0" err="1" smtClean="0"/>
+              <a:t>argumento</a:t>
+            </a:r>
+            <a:r>
+              <a:rPr lang="en-US" dirty="0" smtClean="0"/>
+              <a:t> de um </a:t>
+            </a:r>
+            <a:r>
+              <a:rPr lang="en-US" dirty="0" err="1" smtClean="0"/>
+              <a:t>método</a:t>
+            </a:r>
+            <a:r>
+              <a:rPr lang="en-US" dirty="0" smtClean="0"/>
+              <a:t>, o valor </a:t>
+            </a:r>
+            <a:r>
+              <a:rPr lang="en-US" dirty="0" err="1" smtClean="0"/>
+              <a:t>que</a:t>
+            </a:r>
+            <a:r>
+              <a:rPr lang="en-US" dirty="0" smtClean="0"/>
+              <a:t> </a:t>
+            </a:r>
+            <a:r>
+              <a:rPr lang="en-US" dirty="0" err="1" smtClean="0"/>
+              <a:t>está</a:t>
+            </a:r>
+            <a:r>
+              <a:rPr lang="en-US" dirty="0" smtClean="0"/>
+              <a:t> </a:t>
+            </a:r>
+            <a:r>
+              <a:rPr lang="en-US" dirty="0" err="1" smtClean="0"/>
+              <a:t>sendo</a:t>
+            </a:r>
+            <a:r>
+              <a:rPr lang="en-US" dirty="0" smtClean="0"/>
+              <a:t> </a:t>
+            </a:r>
+            <a:r>
+              <a:rPr lang="en-US" dirty="0" err="1" smtClean="0"/>
+              <a:t>passado</a:t>
+            </a:r>
+            <a:r>
+              <a:rPr lang="en-US" dirty="0" smtClean="0"/>
+              <a:t> </a:t>
+            </a:r>
+            <a:r>
+              <a:rPr lang="en-US" dirty="0" err="1" smtClean="0"/>
+              <a:t>ao</a:t>
+            </a:r>
+            <a:r>
+              <a:rPr lang="en-US" dirty="0" smtClean="0"/>
+              <a:t> </a:t>
+            </a:r>
+            <a:r>
+              <a:rPr lang="en-US" dirty="0" err="1" smtClean="0"/>
+              <a:t>método</a:t>
+            </a:r>
+            <a:r>
+              <a:rPr lang="en-US" dirty="0" smtClean="0"/>
+              <a:t> </a:t>
+            </a:r>
+            <a:r>
+              <a:rPr lang="en-US" dirty="0" err="1" smtClean="0"/>
+              <a:t>é</a:t>
+            </a:r>
+            <a:r>
+              <a:rPr lang="en-US" dirty="0" smtClean="0"/>
+              <a:t> a </a:t>
+            </a:r>
+            <a:r>
+              <a:rPr lang="en-US" dirty="0" err="1" smtClean="0"/>
+              <a:t>referência</a:t>
+            </a:r>
+            <a:r>
+              <a:rPr lang="en-US" dirty="0" smtClean="0"/>
+              <a:t> a </a:t>
+            </a:r>
+            <a:r>
+              <a:rPr lang="en-US" dirty="0" err="1" smtClean="0"/>
+              <a:t>esse</a:t>
+            </a:r>
+            <a:r>
+              <a:rPr lang="en-US" dirty="0" smtClean="0"/>
+              <a:t> </a:t>
+            </a:r>
+            <a:r>
+              <a:rPr lang="en-US" dirty="0" err="1" smtClean="0"/>
+              <a:t>objeto</a:t>
+            </a:r>
+            <a:r>
+              <a:rPr lang="en-US" dirty="0" smtClean="0"/>
+              <a:t> – o valor dos </a:t>
+            </a:r>
+            <a:r>
+              <a:rPr lang="en-US" dirty="0" err="1" smtClean="0"/>
+              <a:t>atributos</a:t>
+            </a:r>
+            <a:r>
+              <a:rPr lang="en-US" dirty="0" smtClean="0"/>
+              <a:t> </a:t>
+            </a:r>
+            <a:r>
+              <a:rPr lang="en-US" dirty="0" err="1" smtClean="0"/>
+              <a:t>desse</a:t>
+            </a:r>
+            <a:r>
+              <a:rPr lang="en-US" dirty="0" smtClean="0"/>
+              <a:t> </a:t>
+            </a:r>
+            <a:r>
+              <a:rPr lang="en-US" dirty="0" err="1" smtClean="0"/>
+              <a:t>objeto</a:t>
+            </a:r>
+            <a:r>
+              <a:rPr lang="en-US" dirty="0"/>
+              <a:t> </a:t>
+            </a:r>
+            <a:r>
+              <a:rPr lang="en-US" dirty="0" err="1" smtClean="0"/>
+              <a:t>podem</a:t>
+            </a:r>
+            <a:r>
+              <a:rPr lang="en-US" dirty="0" smtClean="0"/>
+              <a:t> </a:t>
+            </a:r>
+            <a:r>
+              <a:rPr lang="en-US" dirty="0" err="1" smtClean="0"/>
+              <a:t>ser</a:t>
+            </a:r>
+            <a:r>
+              <a:rPr lang="en-US" dirty="0" smtClean="0"/>
+              <a:t> </a:t>
+            </a:r>
+            <a:r>
+              <a:rPr lang="en-US" dirty="0" err="1" smtClean="0"/>
+              <a:t>modificados</a:t>
+            </a:r>
+            <a:r>
+              <a:rPr lang="en-US" dirty="0" smtClean="0"/>
+              <a:t> no </a:t>
+            </a:r>
+            <a:r>
+              <a:rPr lang="en-US" dirty="0" err="1" smtClean="0"/>
+              <a:t>método</a:t>
+            </a:r>
+            <a:r>
+              <a:rPr lang="en-US" dirty="0" smtClean="0"/>
+              <a:t> </a:t>
+            </a:r>
+            <a:r>
+              <a:rPr lang="en-US" dirty="0" err="1" smtClean="0"/>
+              <a:t>invocado</a:t>
+            </a:r>
+            <a:r>
+              <a:rPr lang="en-US" dirty="0" smtClean="0"/>
+              <a:t>, mas a </a:t>
+            </a:r>
+            <a:r>
+              <a:rPr lang="en-US" dirty="0" err="1" smtClean="0"/>
+              <a:t>referência</a:t>
+            </a:r>
+            <a:r>
+              <a:rPr lang="en-US" dirty="0" smtClean="0"/>
+              <a:t> a </a:t>
+            </a:r>
+            <a:r>
+              <a:rPr lang="en-US" dirty="0" err="1" smtClean="0"/>
+              <a:t>esse</a:t>
+            </a:r>
+            <a:r>
+              <a:rPr lang="en-US" dirty="0" smtClean="0"/>
+              <a:t> </a:t>
+            </a:r>
+            <a:r>
+              <a:rPr lang="en-US" dirty="0" err="1" smtClean="0"/>
+              <a:t>objeto</a:t>
+            </a:r>
+            <a:r>
+              <a:rPr lang="en-US" dirty="0" smtClean="0"/>
+              <a:t> </a:t>
+            </a:r>
+            <a:r>
+              <a:rPr lang="en-US" dirty="0" err="1" smtClean="0"/>
+              <a:t>não</a:t>
+            </a:r>
+            <a:r>
+              <a:rPr lang="en-US" dirty="0" smtClean="0"/>
+              <a:t>.</a:t>
+            </a:r>
+            <a:endParaRPr lang="en-US" dirty="0"/>
+          </a:p>
+        </p:txBody>
+      </p:sp>
+    </p:spTree>
+    <p:extLst>
+      <p:ext uri="{BB962C8B-B14F-4D97-AF65-F5344CB8AC3E}">
+        <p14:creationId xmlns:p14="http://schemas.microsoft.com/office/powerpoint/2010/main" val="2896325204"/>
+      </p:ext>
+    </p:extLst>
+  </p:cSld>
+  <p:clrMapOvr>
+    <a:masterClrMapping/>
+  </p:clrMapOvr>
+</p:sld>
+</file>
+
+<file path=ppt/slides/slide25.xml><?xml version="1.0" encoding="utf-8"?>
+<p:sld xmlns:a="http://schemas.openxmlformats.org/drawingml/2006/main" xmlns:r="http://schemas.openxmlformats.org/officeDocument/2006/relationships" xmlns:p="http://schemas.openxmlformats.org/presentationml/2006/main">
+  <p:cSld>
+    <p:spTree>
+      <p:nvGrpSpPr>
+        <p:cNvPr id="1" name=""/>
+        <p:cNvGrpSpPr/>
+        <p:nvPr/>
+      </p:nvGrpSpPr>
+      <p:grpSpPr>
+        <a:xfrm>
+          <a:off x="0" y="0"/>
+          <a:ext cx="0" cy="0"/>
+          <a:chOff x="0" y="0"/>
+          <a:chExt cx="0" cy="0"/>
+        </a:xfrm>
+      </p:grpSpPr>
+      <p:sp>
+        <p:nvSpPr>
+          <p:cNvPr id="2" name="Title 1"/>
+          <p:cNvSpPr>
+            <a:spLocks noGrp="1"/>
+          </p:cNvSpPr>
+          <p:nvPr>
+            <p:ph type="title"/>
+          </p:nvPr>
+        </p:nvSpPr>
+        <p:spPr/>
+        <p:txBody>
+          <a:bodyPr/>
+          <a:lstStyle/>
+          <a:p>
+            <a:r>
+              <a:rPr lang="en-US" dirty="0" err="1" smtClean="0"/>
+              <a:t>Passagem</a:t>
+            </a:r>
+            <a:r>
+              <a:rPr lang="en-US" dirty="0" smtClean="0"/>
+              <a:t> de Valor</a:t>
+            </a:r>
+            <a:endParaRPr lang="en-US" dirty="0"/>
+          </a:p>
+        </p:txBody>
+      </p:sp>
+      <p:pic>
+        <p:nvPicPr>
+          <p:cNvPr id="5" name="Picture 4"/>
+          <p:cNvPicPr>
+            <a:picLocks noChangeAspect="1"/>
+          </p:cNvPicPr>
+          <p:nvPr/>
+        </p:nvPicPr>
+        <p:blipFill>
+          <a:blip r:embed="rId2"/>
+          <a:stretch>
+            <a:fillRect/>
+          </a:stretch>
+        </p:blipFill>
+        <p:spPr>
+          <a:xfrm>
+            <a:off x="867208" y="1803399"/>
+            <a:ext cx="7421621" cy="4600327"/>
+          </a:xfrm>
+          <a:prstGeom prst="rect">
+            <a:avLst/>
+          </a:prstGeom>
+        </p:spPr>
+      </p:pic>
+    </p:spTree>
+    <p:extLst>
+      <p:ext uri="{BB962C8B-B14F-4D97-AF65-F5344CB8AC3E}">
+        <p14:creationId xmlns:p14="http://schemas.microsoft.com/office/powerpoint/2010/main" val="295905419"/>
+      </p:ext>
+    </p:extLst>
+  </p:cSld>
+  <p:clrMapOvr>
+    <a:masterClrMapping/>
+  </p:clrMapOvr>
+</p:sld>
+</file>
+
+<file path=ppt/slides/slide26.xml><?xml version="1.0" encoding="utf-8"?>
+<p:sld xmlns:a="http://schemas.openxmlformats.org/drawingml/2006/main" xmlns:r="http://schemas.openxmlformats.org/officeDocument/2006/relationships" xmlns:p="http://schemas.openxmlformats.org/presentationml/2006/main">
+  <p:cSld>
+    <p:spTree>
+      <p:nvGrpSpPr>
+        <p:cNvPr id="1" name=""/>
+        <p:cNvGrpSpPr/>
+        <p:nvPr/>
+      </p:nvGrpSpPr>
+      <p:grpSpPr>
+        <a:xfrm>
+          <a:off x="0" y="0"/>
+          <a:ext cx="0" cy="0"/>
+          <a:chOff x="0" y="0"/>
+          <a:chExt cx="0" cy="0"/>
+        </a:xfrm>
+      </p:grpSpPr>
+      <p:sp>
+        <p:nvSpPr>
+          <p:cNvPr id="2" name="Title 1"/>
+          <p:cNvSpPr>
+            <a:spLocks noGrp="1"/>
+          </p:cNvSpPr>
+          <p:nvPr>
+            <p:ph type="title"/>
+          </p:nvPr>
+        </p:nvSpPr>
+        <p:spPr/>
+        <p:txBody>
+          <a:bodyPr/>
+          <a:lstStyle/>
+          <a:p>
+            <a:r>
+              <a:rPr lang="en-US" dirty="0" err="1" smtClean="0"/>
+              <a:t>Passagem</a:t>
+            </a:r>
+            <a:r>
+              <a:rPr lang="en-US" dirty="0" smtClean="0"/>
+              <a:t> de Valor</a:t>
+            </a:r>
+            <a:endParaRPr lang="en-US" dirty="0"/>
+          </a:p>
+        </p:txBody>
+      </p:sp>
+      <p:pic>
+        <p:nvPicPr>
+          <p:cNvPr id="3" name="Picture 2"/>
+          <p:cNvPicPr>
+            <a:picLocks noChangeAspect="1"/>
+          </p:cNvPicPr>
+          <p:nvPr/>
+        </p:nvPicPr>
+        <p:blipFill>
+          <a:blip r:embed="rId2"/>
+          <a:stretch>
+            <a:fillRect/>
+          </a:stretch>
+        </p:blipFill>
+        <p:spPr>
+          <a:xfrm>
+            <a:off x="403152" y="1460500"/>
+            <a:ext cx="8420337" cy="4713558"/>
+          </a:xfrm>
+          <a:prstGeom prst="rect">
+            <a:avLst/>
+          </a:prstGeom>
+        </p:spPr>
+      </p:pic>
+    </p:spTree>
+    <p:extLst>
+      <p:ext uri="{BB962C8B-B14F-4D97-AF65-F5344CB8AC3E}">
+        <p14:creationId xmlns:p14="http://schemas.microsoft.com/office/powerpoint/2010/main" val="924134090"/>
+      </p:ext>
+    </p:extLst>
+  </p:cSld>
+  <p:clrMapOvr>
+    <a:masterClrMapping/>
+  </p:clrMapOvr>
+</p:sld>
+</file>
+
+<file path=ppt/slides/slide27.xml><?xml version="1.0" encoding="utf-8"?>
+<p:sld xmlns:a="http://schemas.openxmlformats.org/drawingml/2006/main" xmlns:r="http://schemas.openxmlformats.org/officeDocument/2006/relationships" xmlns:p="http://schemas.openxmlformats.org/presentationml/2006/main">
+  <p:cSld>
+    <p:spTree>
+      <p:nvGrpSpPr>
+        <p:cNvPr id="1" name=""/>
+        <p:cNvGrpSpPr/>
+        <p:nvPr/>
+      </p:nvGrpSpPr>
+      <p:grpSpPr>
+        <a:xfrm>
+          <a:off x="0" y="0"/>
+          <a:ext cx="0" cy="0"/>
+          <a:chOff x="0" y="0"/>
+          <a:chExt cx="0" cy="0"/>
+        </a:xfrm>
+      </p:grpSpPr>
+      <p:sp>
+        <p:nvSpPr>
+          <p:cNvPr id="2" name="Title 1"/>
+          <p:cNvSpPr>
+            <a:spLocks noGrp="1"/>
+          </p:cNvSpPr>
+          <p:nvPr>
+            <p:ph type="title"/>
+          </p:nvPr>
+        </p:nvSpPr>
+        <p:spPr/>
+        <p:txBody>
+          <a:bodyPr>
+            <a:normAutofit fontScale="90000"/>
+          </a:bodyPr>
+          <a:lstStyle/>
+          <a:p>
+            <a:r>
+              <a:rPr lang="en-US" dirty="0" err="1" smtClean="0"/>
+              <a:t>Encapsulamento</a:t>
+            </a:r>
+            <a:r>
+              <a:rPr lang="en-US" dirty="0" smtClean="0"/>
+              <a:t> e </a:t>
+            </a:r>
+            <a:r>
+              <a:rPr lang="en-US" dirty="0" err="1" smtClean="0"/>
+              <a:t>sobrecarga</a:t>
+            </a:r>
+            <a:r>
+              <a:rPr lang="en-US" dirty="0" smtClean="0"/>
+              <a:t> de </a:t>
+            </a:r>
+            <a:r>
+              <a:rPr lang="en-US" dirty="0" err="1" smtClean="0"/>
+              <a:t>m</a:t>
+            </a:r>
+            <a:r>
+              <a:rPr lang="en-US" dirty="0" err="1" smtClean="0"/>
+              <a:t>étodos</a:t>
+            </a:r>
+            <a:endParaRPr lang="en-US" dirty="0"/>
+          </a:p>
+        </p:txBody>
+      </p:sp>
+      <p:sp>
+        <p:nvSpPr>
+          <p:cNvPr id="3" name="Content Placeholder 2"/>
+          <p:cNvSpPr>
+            <a:spLocks noGrp="1"/>
+          </p:cNvSpPr>
+          <p:nvPr>
+            <p:ph idx="1"/>
+          </p:nvPr>
+        </p:nvSpPr>
+        <p:spPr/>
+        <p:txBody>
+          <a:bodyPr/>
+          <a:lstStyle/>
+          <a:p>
+            <a:r>
+              <a:rPr lang="en-US" dirty="0" err="1" smtClean="0"/>
+              <a:t>Controle</a:t>
+            </a:r>
+            <a:r>
+              <a:rPr lang="en-US" dirty="0" smtClean="0"/>
+              <a:t> </a:t>
+            </a:r>
+            <a:r>
+              <a:rPr lang="en-US" dirty="0" err="1" smtClean="0"/>
+              <a:t>sobre</a:t>
+            </a:r>
+            <a:r>
+              <a:rPr lang="en-US" dirty="0"/>
+              <a:t> </a:t>
+            </a:r>
+            <a:r>
+              <a:rPr lang="en-US" dirty="0" smtClean="0"/>
+              <a:t>a </a:t>
+            </a:r>
+            <a:r>
+              <a:rPr lang="en-US" dirty="0" err="1" smtClean="0"/>
+              <a:t>acessibilidade</a:t>
+            </a:r>
+            <a:r>
+              <a:rPr lang="en-US" dirty="0" smtClean="0"/>
+              <a:t> dos </a:t>
+            </a:r>
+            <a:r>
+              <a:rPr lang="en-US" dirty="0" err="1" smtClean="0"/>
+              <a:t>membros</a:t>
+            </a:r>
+            <a:r>
+              <a:rPr lang="en-US" dirty="0" smtClean="0"/>
+              <a:t> de </a:t>
+            </a:r>
+            <a:r>
+              <a:rPr lang="en-US" dirty="0" err="1" smtClean="0"/>
+              <a:t>uma</a:t>
+            </a:r>
+            <a:r>
+              <a:rPr lang="en-US" dirty="0" smtClean="0"/>
+              <a:t> </a:t>
+            </a:r>
+            <a:r>
+              <a:rPr lang="en-US" dirty="0" err="1" smtClean="0"/>
+              <a:t>classe</a:t>
+            </a:r>
+            <a:r>
+              <a:rPr lang="en-US" dirty="0" smtClean="0"/>
+              <a:t> e a </a:t>
+            </a:r>
+            <a:r>
+              <a:rPr lang="en-US" dirty="0" err="1" smtClean="0"/>
+              <a:t>implementa</a:t>
+            </a:r>
+            <a:r>
+              <a:rPr lang="en-US" dirty="0" err="1" smtClean="0"/>
+              <a:t>ção</a:t>
+            </a:r>
+            <a:r>
+              <a:rPr lang="en-US" dirty="0" smtClean="0"/>
+              <a:t> de classes com </a:t>
+            </a:r>
+            <a:r>
+              <a:rPr lang="en-US" dirty="0" err="1" smtClean="0"/>
+              <a:t>comportamento</a:t>
+            </a:r>
+            <a:r>
+              <a:rPr lang="en-US" dirty="0" smtClean="0"/>
+              <a:t> </a:t>
+            </a:r>
+            <a:r>
+              <a:rPr lang="en-US" dirty="0" err="1" smtClean="0"/>
+              <a:t>dinâmico</a:t>
+            </a:r>
+            <a:r>
+              <a:rPr lang="en-US" dirty="0" smtClean="0"/>
+              <a:t> </a:t>
+            </a:r>
+            <a:r>
+              <a:rPr lang="en-US" dirty="0" err="1" smtClean="0"/>
+              <a:t>através</a:t>
+            </a:r>
+            <a:r>
+              <a:rPr lang="en-US" dirty="0" smtClean="0"/>
+              <a:t> da </a:t>
+            </a:r>
+            <a:r>
+              <a:rPr lang="en-US" dirty="0" err="1" smtClean="0"/>
+              <a:t>sobrecarga</a:t>
+            </a:r>
+            <a:r>
+              <a:rPr lang="en-US" dirty="0" smtClean="0"/>
+              <a:t> de </a:t>
+            </a:r>
+            <a:r>
+              <a:rPr lang="en-US" dirty="0" err="1" smtClean="0"/>
+              <a:t>métodos</a:t>
+            </a:r>
+            <a:r>
+              <a:rPr lang="en-US" dirty="0" smtClean="0"/>
+              <a:t>.</a:t>
+            </a:r>
+            <a:endParaRPr lang="en-US" dirty="0"/>
+          </a:p>
+        </p:txBody>
+      </p:sp>
+    </p:spTree>
+    <p:extLst>
+      <p:ext uri="{BB962C8B-B14F-4D97-AF65-F5344CB8AC3E}">
+        <p14:creationId xmlns:p14="http://schemas.microsoft.com/office/powerpoint/2010/main" val="3256534258"/>
+      </p:ext>
+    </p:extLst>
+  </p:cSld>
+  <p:clrMapOvr>
+    <a:masterClrMapping/>
+  </p:clrMapOvr>
+</p:sld>
+</file>
+
+<file path=ppt/slides/slide28.xml><?xml version="1.0" encoding="utf-8"?>
+<p:sld xmlns:a="http://schemas.openxmlformats.org/drawingml/2006/main" xmlns:r="http://schemas.openxmlformats.org/officeDocument/2006/relationships" xmlns:p="http://schemas.openxmlformats.org/presentationml/2006/main">
+  <p:cSld>
+    <p:spTree>
+      <p:nvGrpSpPr>
+        <p:cNvPr id="1" name=""/>
+        <p:cNvGrpSpPr/>
+        <p:nvPr/>
+      </p:nvGrpSpPr>
+      <p:grpSpPr>
+        <a:xfrm>
+          <a:off x="0" y="0"/>
+          <a:ext cx="0" cy="0"/>
+          <a:chOff x="0" y="0"/>
+          <a:chExt cx="0" cy="0"/>
+        </a:xfrm>
+      </p:grpSpPr>
+      <p:sp>
+        <p:nvSpPr>
+          <p:cNvPr id="2" name="Title 1"/>
+          <p:cNvSpPr>
+            <a:spLocks noGrp="1"/>
+          </p:cNvSpPr>
+          <p:nvPr>
+            <p:ph type="title"/>
+          </p:nvPr>
+        </p:nvSpPr>
+        <p:spPr/>
+        <p:txBody>
+          <a:bodyPr>
+            <a:normAutofit fontScale="90000"/>
+          </a:bodyPr>
+          <a:lstStyle/>
+          <a:p>
+            <a:r>
+              <a:rPr lang="en-US" dirty="0" err="1" smtClean="0"/>
+              <a:t>Acessibilidade</a:t>
+            </a:r>
+            <a:r>
+              <a:rPr lang="en-US" dirty="0" smtClean="0"/>
+              <a:t> dos </a:t>
+            </a:r>
+            <a:r>
+              <a:rPr lang="en-US" dirty="0" err="1" smtClean="0"/>
+              <a:t>membros</a:t>
+            </a:r>
+            <a:r>
+              <a:rPr lang="en-US" dirty="0" smtClean="0"/>
+              <a:t> de </a:t>
+            </a:r>
+            <a:r>
+              <a:rPr lang="en-US" dirty="0" err="1" smtClean="0"/>
+              <a:t>uma</a:t>
+            </a:r>
+            <a:r>
+              <a:rPr lang="en-US" dirty="0" smtClean="0"/>
+              <a:t> </a:t>
+            </a:r>
+            <a:r>
+              <a:rPr lang="en-US" dirty="0" err="1" smtClean="0"/>
+              <a:t>classe</a:t>
+            </a:r>
+            <a:endParaRPr lang="en-US" dirty="0"/>
+          </a:p>
+        </p:txBody>
+      </p:sp>
+      <p:sp>
+        <p:nvSpPr>
+          <p:cNvPr id="3" name="Content Placeholder 2"/>
+          <p:cNvSpPr>
+            <a:spLocks noGrp="1"/>
+          </p:cNvSpPr>
+          <p:nvPr>
+            <p:ph idx="1"/>
+          </p:nvPr>
+        </p:nvSpPr>
+        <p:spPr/>
+        <p:txBody>
+          <a:bodyPr/>
+          <a:lstStyle/>
+          <a:p>
+            <a:r>
+              <a:rPr lang="en-US" dirty="0" err="1" smtClean="0"/>
+              <a:t>Veja</a:t>
+            </a:r>
+            <a:r>
+              <a:rPr lang="en-US" dirty="0" smtClean="0"/>
+              <a:t> o </a:t>
+            </a:r>
+            <a:r>
+              <a:rPr lang="en-US" dirty="0" err="1" smtClean="0"/>
+              <a:t>exemplo</a:t>
+            </a:r>
+            <a:r>
+              <a:rPr lang="en-US" dirty="0" smtClean="0"/>
+              <a:t> da </a:t>
+            </a:r>
+            <a:r>
+              <a:rPr lang="en-US" dirty="0" err="1" smtClean="0"/>
+              <a:t>classe</a:t>
+            </a:r>
+            <a:r>
+              <a:rPr lang="en-US" dirty="0" smtClean="0"/>
+              <a:t> </a:t>
+            </a:r>
+            <a:r>
+              <a:rPr lang="en-US" dirty="0" err="1" smtClean="0"/>
+              <a:t>Avaliacao</a:t>
+            </a:r>
+            <a:r>
+              <a:rPr lang="en-US" dirty="0" smtClean="0"/>
+              <a:t>. </a:t>
+            </a:r>
+            <a:r>
+              <a:rPr lang="en-US" dirty="0" err="1" smtClean="0"/>
+              <a:t>Quando</a:t>
+            </a:r>
+            <a:r>
+              <a:rPr lang="en-US" dirty="0"/>
+              <a:t> </a:t>
+            </a:r>
+            <a:r>
+              <a:rPr lang="en-US" dirty="0" err="1" smtClean="0"/>
+              <a:t>instanciamos</a:t>
+            </a:r>
+            <a:r>
+              <a:rPr lang="en-US" dirty="0" smtClean="0"/>
+              <a:t> um </a:t>
+            </a:r>
+            <a:r>
+              <a:rPr lang="en-US" dirty="0" err="1" smtClean="0"/>
+              <a:t>objeto</a:t>
+            </a:r>
+            <a:r>
+              <a:rPr lang="en-US" dirty="0" smtClean="0"/>
+              <a:t> da </a:t>
+            </a:r>
+            <a:r>
+              <a:rPr lang="en-US" dirty="0" err="1" smtClean="0"/>
+              <a:t>classe</a:t>
+            </a:r>
+            <a:r>
+              <a:rPr lang="en-US" dirty="0" smtClean="0"/>
+              <a:t> </a:t>
+            </a:r>
+            <a:r>
+              <a:rPr lang="en-US" dirty="0" err="1" smtClean="0"/>
+              <a:t>Avaliacao</a:t>
+            </a:r>
+            <a:r>
+              <a:rPr lang="en-US" dirty="0" smtClean="0"/>
+              <a:t>, </a:t>
+            </a:r>
+            <a:r>
+              <a:rPr lang="en-US" dirty="0" err="1" smtClean="0"/>
+              <a:t>seus</a:t>
+            </a:r>
+            <a:r>
+              <a:rPr lang="en-US" dirty="0" smtClean="0"/>
+              <a:t> </a:t>
+            </a:r>
+            <a:r>
+              <a:rPr lang="en-US" dirty="0" err="1" smtClean="0"/>
+              <a:t>membros</a:t>
+            </a:r>
+            <a:r>
+              <a:rPr lang="en-US" dirty="0" smtClean="0"/>
+              <a:t> </a:t>
+            </a:r>
+            <a:r>
+              <a:rPr lang="en-US" dirty="0" err="1" smtClean="0"/>
+              <a:t>podem</a:t>
+            </a:r>
+            <a:r>
+              <a:rPr lang="en-US" dirty="0" smtClean="0"/>
+              <a:t> </a:t>
+            </a:r>
+            <a:r>
+              <a:rPr lang="en-US" dirty="0" err="1" smtClean="0"/>
+              <a:t>ser</a:t>
+            </a:r>
+            <a:r>
+              <a:rPr lang="en-US" dirty="0" smtClean="0"/>
+              <a:t> </a:t>
+            </a:r>
+            <a:r>
+              <a:rPr lang="en-US" dirty="0" err="1" smtClean="0"/>
+              <a:t>acessados</a:t>
+            </a:r>
+            <a:r>
+              <a:rPr lang="en-US" dirty="0" smtClean="0"/>
+              <a:t> </a:t>
+            </a:r>
+            <a:r>
+              <a:rPr lang="en-US" dirty="0" err="1" smtClean="0"/>
+              <a:t>por</a:t>
+            </a:r>
+            <a:r>
+              <a:rPr lang="en-US" dirty="0" smtClean="0"/>
+              <a:t> </a:t>
+            </a:r>
+            <a:r>
+              <a:rPr lang="en-US" dirty="0" err="1" smtClean="0"/>
+              <a:t>quaisquer</a:t>
+            </a:r>
+            <a:r>
+              <a:rPr lang="en-US" dirty="0" smtClean="0"/>
+              <a:t> outros </a:t>
+            </a:r>
+            <a:r>
+              <a:rPr lang="en-US" dirty="0" err="1" smtClean="0"/>
+              <a:t>objetos</a:t>
+            </a:r>
+            <a:r>
+              <a:rPr lang="en-US" dirty="0" smtClean="0"/>
+              <a:t> </a:t>
+            </a:r>
+            <a:r>
+              <a:rPr lang="en-US" dirty="0" err="1" smtClean="0"/>
+              <a:t>na</a:t>
+            </a:r>
+            <a:r>
+              <a:rPr lang="en-US" dirty="0" smtClean="0"/>
+              <a:t> JVM. </a:t>
+            </a:r>
+            <a:r>
+              <a:rPr lang="en-US" dirty="0" err="1" smtClean="0"/>
+              <a:t>Isso</a:t>
+            </a:r>
+            <a:r>
+              <a:rPr lang="en-US" dirty="0" smtClean="0"/>
+              <a:t> </a:t>
+            </a:r>
+            <a:r>
+              <a:rPr lang="en-US" dirty="0" err="1" smtClean="0"/>
+              <a:t>é</a:t>
+            </a:r>
+            <a:r>
+              <a:rPr lang="en-US" dirty="0" smtClean="0"/>
+              <a:t> </a:t>
+            </a:r>
+            <a:r>
+              <a:rPr lang="en-US" dirty="0" err="1" smtClean="0"/>
+              <a:t>definido</a:t>
+            </a:r>
+            <a:r>
+              <a:rPr lang="en-US" dirty="0" smtClean="0"/>
+              <a:t> </a:t>
+            </a:r>
+            <a:r>
+              <a:rPr lang="en-US" dirty="0" err="1" smtClean="0"/>
+              <a:t>pelo</a:t>
+            </a:r>
+            <a:r>
+              <a:rPr lang="en-US" dirty="0" smtClean="0"/>
+              <a:t> </a:t>
+            </a:r>
+            <a:r>
+              <a:rPr lang="en-US" dirty="0" err="1" smtClean="0"/>
+              <a:t>modificar</a:t>
+            </a:r>
+            <a:r>
+              <a:rPr lang="en-US" dirty="0" smtClean="0"/>
+              <a:t> </a:t>
+            </a:r>
+            <a:r>
+              <a:rPr lang="en-US" b="1" i="1" dirty="0" smtClean="0"/>
+              <a:t>public </a:t>
+            </a:r>
+            <a:r>
+              <a:rPr lang="en-US" dirty="0" err="1" smtClean="0"/>
+              <a:t>que</a:t>
+            </a:r>
+            <a:r>
+              <a:rPr lang="en-US" dirty="0" smtClean="0"/>
+              <a:t> antecede a </a:t>
+            </a:r>
+            <a:r>
+              <a:rPr lang="en-US" dirty="0" err="1" smtClean="0"/>
+              <a:t>declaração</a:t>
+            </a:r>
+            <a:r>
+              <a:rPr lang="en-US" dirty="0" smtClean="0"/>
+              <a:t> </a:t>
+            </a:r>
+            <a:r>
+              <a:rPr lang="en-US" dirty="0" err="1" smtClean="0"/>
+              <a:t>desses</a:t>
+            </a:r>
+            <a:r>
+              <a:rPr lang="en-US" dirty="0" smtClean="0"/>
+              <a:t> </a:t>
+            </a:r>
+            <a:r>
+              <a:rPr lang="en-US" dirty="0" err="1" smtClean="0"/>
+              <a:t>membros</a:t>
+            </a:r>
+            <a:r>
+              <a:rPr lang="en-US" dirty="0" smtClean="0"/>
+              <a:t>.</a:t>
+            </a:r>
+            <a:endParaRPr lang="en-US" dirty="0"/>
+          </a:p>
+        </p:txBody>
+      </p:sp>
+    </p:spTree>
+    <p:extLst>
+      <p:ext uri="{BB962C8B-B14F-4D97-AF65-F5344CB8AC3E}">
+        <p14:creationId xmlns:p14="http://schemas.microsoft.com/office/powerpoint/2010/main" val="1983222999"/>
+      </p:ext>
+    </p:extLst>
+  </p:cSld>
+  <p:clrMapOvr>
+    <a:masterClrMapping/>
+  </p:clrMapOvr>
+</p:sld>
+</file>
+
+<file path=ppt/slides/slide29.xml><?xml version="1.0" encoding="utf-8"?>
+<p:sld xmlns:a="http://schemas.openxmlformats.org/drawingml/2006/main" xmlns:r="http://schemas.openxmlformats.org/officeDocument/2006/relationships" xmlns:p="http://schemas.openxmlformats.org/presentationml/2006/main">
+  <p:cSld>
+    <p:spTree>
+      <p:nvGrpSpPr>
+        <p:cNvPr id="1" name=""/>
+        <p:cNvGrpSpPr/>
+        <p:nvPr/>
+      </p:nvGrpSpPr>
+      <p:grpSpPr>
+        <a:xfrm>
+          <a:off x="0" y="0"/>
+          <a:ext cx="0" cy="0"/>
+          <a:chOff x="0" y="0"/>
+          <a:chExt cx="0" cy="0"/>
+        </a:xfrm>
+      </p:grpSpPr>
+      <p:sp>
+        <p:nvSpPr>
+          <p:cNvPr id="2" name="Title 1"/>
+          <p:cNvSpPr>
+            <a:spLocks noGrp="1"/>
+          </p:cNvSpPr>
+          <p:nvPr>
+            <p:ph type="title"/>
+          </p:nvPr>
+        </p:nvSpPr>
+        <p:spPr/>
+        <p:txBody>
+          <a:bodyPr>
+            <a:normAutofit fontScale="90000"/>
+          </a:bodyPr>
+          <a:lstStyle/>
+          <a:p>
+            <a:r>
+              <a:rPr lang="en-US" dirty="0" err="1" smtClean="0"/>
+              <a:t>Acessibilidade</a:t>
+            </a:r>
+            <a:r>
+              <a:rPr lang="en-US" dirty="0" smtClean="0"/>
+              <a:t> dos </a:t>
+            </a:r>
+            <a:r>
+              <a:rPr lang="en-US" dirty="0" err="1" smtClean="0"/>
+              <a:t>membros</a:t>
+            </a:r>
+            <a:r>
+              <a:rPr lang="en-US" dirty="0" smtClean="0"/>
+              <a:t> de </a:t>
+            </a:r>
+            <a:r>
+              <a:rPr lang="en-US" dirty="0" err="1" smtClean="0"/>
+              <a:t>uma</a:t>
+            </a:r>
+            <a:r>
+              <a:rPr lang="en-US" dirty="0" smtClean="0"/>
+              <a:t> </a:t>
+            </a:r>
+            <a:r>
+              <a:rPr lang="en-US" dirty="0" err="1" smtClean="0"/>
+              <a:t>classe</a:t>
+            </a:r>
+            <a:endParaRPr lang="en-US" dirty="0"/>
+          </a:p>
+        </p:txBody>
+      </p:sp>
+      <p:pic>
+        <p:nvPicPr>
+          <p:cNvPr id="4" name="Picture 3"/>
+          <p:cNvPicPr>
+            <a:picLocks noChangeAspect="1"/>
+          </p:cNvPicPr>
+          <p:nvPr/>
+        </p:nvPicPr>
+        <p:blipFill>
+          <a:blip r:embed="rId2"/>
+          <a:stretch>
+            <a:fillRect/>
+          </a:stretch>
+        </p:blipFill>
+        <p:spPr>
+          <a:xfrm>
+            <a:off x="457200" y="2188616"/>
+            <a:ext cx="8367088" cy="3208009"/>
+          </a:xfrm>
+          <a:prstGeom prst="rect">
+            <a:avLst/>
+          </a:prstGeom>
+        </p:spPr>
+      </p:pic>
+    </p:spTree>
+    <p:extLst>
+      <p:ext uri="{BB962C8B-B14F-4D97-AF65-F5344CB8AC3E}">
+        <p14:creationId xmlns:p14="http://schemas.microsoft.com/office/powerpoint/2010/main" val="1558590240"/>
       </p:ext>
     </p:extLst>
   </p:cSld>
@@ -11323,6 +12531,2046 @@
       </p:par>
     </p:tnLst>
   </p:timing>
+</p:sld>
+</file>
+
+<file path=ppt/slides/slide30.xml><?xml version="1.0" encoding="utf-8"?>
+<p:sld xmlns:a="http://schemas.openxmlformats.org/drawingml/2006/main" xmlns:r="http://schemas.openxmlformats.org/officeDocument/2006/relationships" xmlns:p="http://schemas.openxmlformats.org/presentationml/2006/main">
+  <p:cSld>
+    <p:spTree>
+      <p:nvGrpSpPr>
+        <p:cNvPr id="1" name=""/>
+        <p:cNvGrpSpPr/>
+        <p:nvPr/>
+      </p:nvGrpSpPr>
+      <p:grpSpPr>
+        <a:xfrm>
+          <a:off x="0" y="0"/>
+          <a:ext cx="0" cy="0"/>
+          <a:chOff x="0" y="0"/>
+          <a:chExt cx="0" cy="0"/>
+        </a:xfrm>
+      </p:grpSpPr>
+      <p:sp>
+        <p:nvSpPr>
+          <p:cNvPr id="2" name="Title 1"/>
+          <p:cNvSpPr>
+            <a:spLocks noGrp="1"/>
+          </p:cNvSpPr>
+          <p:nvPr>
+            <p:ph type="title"/>
+          </p:nvPr>
+        </p:nvSpPr>
+        <p:spPr/>
+        <p:txBody>
+          <a:bodyPr>
+            <a:normAutofit fontScale="90000"/>
+          </a:bodyPr>
+          <a:lstStyle/>
+          <a:p>
+            <a:r>
+              <a:rPr lang="en-US" dirty="0" err="1" smtClean="0"/>
+              <a:t>Acessibilidade</a:t>
+            </a:r>
+            <a:r>
+              <a:rPr lang="en-US" dirty="0" smtClean="0"/>
+              <a:t> dos </a:t>
+            </a:r>
+            <a:r>
+              <a:rPr lang="en-US" dirty="0" err="1" smtClean="0"/>
+              <a:t>membros</a:t>
+            </a:r>
+            <a:r>
+              <a:rPr lang="en-US" dirty="0" smtClean="0"/>
+              <a:t> de </a:t>
+            </a:r>
+            <a:r>
+              <a:rPr lang="en-US" dirty="0" err="1" smtClean="0"/>
+              <a:t>uma</a:t>
+            </a:r>
+            <a:r>
+              <a:rPr lang="en-US" dirty="0" smtClean="0"/>
+              <a:t> </a:t>
+            </a:r>
+            <a:r>
+              <a:rPr lang="en-US" dirty="0" err="1" smtClean="0"/>
+              <a:t>classe</a:t>
+            </a:r>
+            <a:endParaRPr lang="en-US" dirty="0"/>
+          </a:p>
+        </p:txBody>
+      </p:sp>
+      <p:pic>
+        <p:nvPicPr>
+          <p:cNvPr id="3" name="Picture 2"/>
+          <p:cNvPicPr>
+            <a:picLocks noChangeAspect="1"/>
+          </p:cNvPicPr>
+          <p:nvPr/>
+        </p:nvPicPr>
+        <p:blipFill>
+          <a:blip r:embed="rId2"/>
+          <a:stretch>
+            <a:fillRect/>
+          </a:stretch>
+        </p:blipFill>
+        <p:spPr>
+          <a:xfrm>
+            <a:off x="182323" y="2108199"/>
+            <a:ext cx="8867093" cy="3390359"/>
+          </a:xfrm>
+          <a:prstGeom prst="rect">
+            <a:avLst/>
+          </a:prstGeom>
+        </p:spPr>
+      </p:pic>
+    </p:spTree>
+    <p:extLst>
+      <p:ext uri="{BB962C8B-B14F-4D97-AF65-F5344CB8AC3E}">
+        <p14:creationId xmlns:p14="http://schemas.microsoft.com/office/powerpoint/2010/main" val="3040606519"/>
+      </p:ext>
+    </p:extLst>
+  </p:cSld>
+  <p:clrMapOvr>
+    <a:masterClrMapping/>
+  </p:clrMapOvr>
+</p:sld>
+</file>
+
+<file path=ppt/slides/slide31.xml><?xml version="1.0" encoding="utf-8"?>
+<p:sld xmlns:a="http://schemas.openxmlformats.org/drawingml/2006/main" xmlns:r="http://schemas.openxmlformats.org/officeDocument/2006/relationships" xmlns:p="http://schemas.openxmlformats.org/presentationml/2006/main">
+  <p:cSld>
+    <p:spTree>
+      <p:nvGrpSpPr>
+        <p:cNvPr id="1" name=""/>
+        <p:cNvGrpSpPr/>
+        <p:nvPr/>
+      </p:nvGrpSpPr>
+      <p:grpSpPr>
+        <a:xfrm>
+          <a:off x="0" y="0"/>
+          <a:ext cx="0" cy="0"/>
+          <a:chOff x="0" y="0"/>
+          <a:chExt cx="0" cy="0"/>
+        </a:xfrm>
+      </p:grpSpPr>
+      <p:sp>
+        <p:nvSpPr>
+          <p:cNvPr id="2" name="Title 1"/>
+          <p:cNvSpPr>
+            <a:spLocks noGrp="1"/>
+          </p:cNvSpPr>
+          <p:nvPr>
+            <p:ph type="title"/>
+          </p:nvPr>
+        </p:nvSpPr>
+        <p:spPr/>
+        <p:txBody>
+          <a:bodyPr>
+            <a:normAutofit fontScale="90000"/>
+          </a:bodyPr>
+          <a:lstStyle/>
+          <a:p>
+            <a:r>
+              <a:rPr lang="en-US" dirty="0" err="1" smtClean="0"/>
+              <a:t>Acessibilidade</a:t>
+            </a:r>
+            <a:r>
+              <a:rPr lang="en-US" dirty="0" smtClean="0"/>
+              <a:t> dos </a:t>
+            </a:r>
+            <a:r>
+              <a:rPr lang="en-US" dirty="0" err="1" smtClean="0"/>
+              <a:t>membros</a:t>
+            </a:r>
+            <a:r>
+              <a:rPr lang="en-US" dirty="0" smtClean="0"/>
+              <a:t> de </a:t>
+            </a:r>
+            <a:r>
+              <a:rPr lang="en-US" dirty="0" err="1" smtClean="0"/>
+              <a:t>uma</a:t>
+            </a:r>
+            <a:r>
+              <a:rPr lang="en-US" dirty="0" smtClean="0"/>
+              <a:t> </a:t>
+            </a:r>
+            <a:r>
+              <a:rPr lang="en-US" dirty="0" err="1" smtClean="0"/>
+              <a:t>classe</a:t>
+            </a:r>
+            <a:endParaRPr lang="en-US" dirty="0"/>
+          </a:p>
+        </p:txBody>
+      </p:sp>
+      <p:sp>
+        <p:nvSpPr>
+          <p:cNvPr id="4" name="Content Placeholder 2"/>
+          <p:cNvSpPr>
+            <a:spLocks noGrp="1"/>
+          </p:cNvSpPr>
+          <p:nvPr>
+            <p:ph idx="1"/>
+          </p:nvPr>
+        </p:nvSpPr>
+        <p:spPr>
+          <a:xfrm>
+            <a:off x="457200" y="1600200"/>
+            <a:ext cx="8229600" cy="4525963"/>
+          </a:xfrm>
+        </p:spPr>
+        <p:txBody>
+          <a:bodyPr/>
+          <a:lstStyle/>
+          <a:p>
+            <a:r>
+              <a:rPr lang="en-US" dirty="0" err="1" smtClean="0"/>
+              <a:t>Algumas</a:t>
+            </a:r>
+            <a:r>
+              <a:rPr lang="en-US" dirty="0" smtClean="0"/>
+              <a:t> </a:t>
+            </a:r>
+            <a:r>
+              <a:rPr lang="en-US" dirty="0" err="1" smtClean="0"/>
+              <a:t>vezes</a:t>
+            </a:r>
+            <a:r>
+              <a:rPr lang="en-US" dirty="0" smtClean="0"/>
+              <a:t> </a:t>
+            </a:r>
+            <a:r>
+              <a:rPr lang="en-US" dirty="0" err="1" smtClean="0"/>
+              <a:t>precisamos</a:t>
+            </a:r>
+            <a:r>
+              <a:rPr lang="en-US" dirty="0" smtClean="0"/>
+              <a:t> </a:t>
+            </a:r>
+            <a:r>
+              <a:rPr lang="en-US" dirty="0" err="1" smtClean="0"/>
+              <a:t>evitar</a:t>
+            </a:r>
+            <a:r>
+              <a:rPr lang="en-US" dirty="0" smtClean="0"/>
+              <a:t> </a:t>
+            </a:r>
+            <a:r>
+              <a:rPr lang="en-US" dirty="0" err="1" smtClean="0"/>
+              <a:t>que</a:t>
+            </a:r>
+            <a:r>
+              <a:rPr lang="en-US" dirty="0" smtClean="0"/>
+              <a:t> </a:t>
+            </a:r>
+            <a:r>
+              <a:rPr lang="en-US" dirty="0" err="1" smtClean="0"/>
+              <a:t>valores</a:t>
+            </a:r>
+            <a:r>
+              <a:rPr lang="en-US" dirty="0" smtClean="0"/>
+              <a:t> </a:t>
+            </a:r>
+            <a:r>
+              <a:rPr lang="en-US" dirty="0" err="1" smtClean="0"/>
+              <a:t>inv</a:t>
+            </a:r>
+            <a:r>
+              <a:rPr lang="en-US" dirty="0" err="1" smtClean="0"/>
+              <a:t>álidos</a:t>
+            </a:r>
+            <a:r>
+              <a:rPr lang="en-US" dirty="0" smtClean="0"/>
+              <a:t> </a:t>
+            </a:r>
+            <a:r>
+              <a:rPr lang="en-US" dirty="0" err="1" smtClean="0"/>
+              <a:t>ou</a:t>
+            </a:r>
+            <a:r>
+              <a:rPr lang="en-US" dirty="0" smtClean="0"/>
+              <a:t> </a:t>
+            </a:r>
+            <a:r>
+              <a:rPr lang="en-US" dirty="0" err="1" smtClean="0"/>
+              <a:t>comportamentos</a:t>
+            </a:r>
+            <a:r>
+              <a:rPr lang="en-US" dirty="0" smtClean="0"/>
+              <a:t> </a:t>
+            </a:r>
+            <a:r>
+              <a:rPr lang="en-US" dirty="0" err="1" smtClean="0"/>
+              <a:t>inválidos</a:t>
+            </a:r>
+            <a:r>
+              <a:rPr lang="en-US" dirty="0" smtClean="0"/>
+              <a:t> </a:t>
+            </a:r>
+            <a:r>
+              <a:rPr lang="en-US" dirty="0" err="1" smtClean="0"/>
+              <a:t>sejam</a:t>
+            </a:r>
+            <a:r>
+              <a:rPr lang="en-US" dirty="0" smtClean="0"/>
+              <a:t> </a:t>
+            </a:r>
+            <a:r>
+              <a:rPr lang="en-US" dirty="0" err="1" smtClean="0"/>
+              <a:t>atribuídos</a:t>
+            </a:r>
+            <a:r>
+              <a:rPr lang="en-US" dirty="0"/>
+              <a:t> </a:t>
+            </a:r>
+            <a:r>
+              <a:rPr lang="en-US" dirty="0" err="1" smtClean="0"/>
+              <a:t>aos</a:t>
+            </a:r>
+            <a:r>
+              <a:rPr lang="en-US" dirty="0" smtClean="0"/>
+              <a:t> </a:t>
+            </a:r>
+            <a:r>
+              <a:rPr lang="en-US" dirty="0" err="1" smtClean="0"/>
+              <a:t>membros</a:t>
+            </a:r>
+            <a:r>
+              <a:rPr lang="en-US" dirty="0" smtClean="0"/>
+              <a:t> de </a:t>
+            </a:r>
+            <a:r>
+              <a:rPr lang="en-US" dirty="0" err="1" smtClean="0"/>
+              <a:t>uma</a:t>
+            </a:r>
+            <a:r>
+              <a:rPr lang="en-US" dirty="0" smtClean="0"/>
+              <a:t> </a:t>
+            </a:r>
+            <a:r>
+              <a:rPr lang="en-US" dirty="0" err="1" smtClean="0"/>
+              <a:t>classe</a:t>
+            </a:r>
+            <a:r>
+              <a:rPr lang="en-US" dirty="0" smtClean="0"/>
+              <a:t>. No </a:t>
+            </a:r>
+            <a:r>
+              <a:rPr lang="en-US" dirty="0" err="1" smtClean="0"/>
+              <a:t>exemplo</a:t>
+            </a:r>
+            <a:r>
+              <a:rPr lang="en-US" dirty="0" smtClean="0"/>
+              <a:t> </a:t>
+            </a:r>
+            <a:r>
+              <a:rPr lang="en-US" dirty="0" err="1" smtClean="0"/>
+              <a:t>uma</a:t>
+            </a:r>
+            <a:r>
+              <a:rPr lang="en-US" dirty="0" smtClean="0"/>
+              <a:t> nota </a:t>
+            </a:r>
+            <a:r>
+              <a:rPr lang="en-US" dirty="0" err="1" smtClean="0"/>
+              <a:t>jamais</a:t>
+            </a:r>
+            <a:r>
+              <a:rPr lang="en-US" dirty="0" smtClean="0"/>
+              <a:t> </a:t>
+            </a:r>
+            <a:r>
+              <a:rPr lang="en-US" dirty="0" err="1" smtClean="0"/>
+              <a:t>poderia</a:t>
+            </a:r>
+            <a:r>
+              <a:rPr lang="en-US" dirty="0" smtClean="0"/>
+              <a:t> </a:t>
+            </a:r>
+            <a:r>
+              <a:rPr lang="en-US" dirty="0" err="1" smtClean="0"/>
+              <a:t>ser</a:t>
+            </a:r>
+            <a:r>
+              <a:rPr lang="en-US" dirty="0" smtClean="0"/>
+              <a:t> </a:t>
+            </a:r>
+            <a:r>
+              <a:rPr lang="en-US" dirty="0" err="1" smtClean="0"/>
+              <a:t>negativa</a:t>
+            </a:r>
+            <a:r>
+              <a:rPr lang="en-US" dirty="0" smtClean="0"/>
+              <a:t> </a:t>
+            </a:r>
+            <a:r>
+              <a:rPr lang="en-US" dirty="0" err="1" smtClean="0"/>
+              <a:t>ou</a:t>
+            </a:r>
+            <a:r>
+              <a:rPr lang="en-US" dirty="0" smtClean="0"/>
+              <a:t> </a:t>
+            </a:r>
+            <a:r>
+              <a:rPr lang="en-US" dirty="0" err="1" smtClean="0"/>
+              <a:t>maior</a:t>
+            </a:r>
+            <a:r>
+              <a:rPr lang="en-US" dirty="0" smtClean="0"/>
+              <a:t> </a:t>
+            </a:r>
+            <a:r>
+              <a:rPr lang="en-US" dirty="0" err="1" smtClean="0"/>
+              <a:t>que</a:t>
+            </a:r>
+            <a:r>
+              <a:rPr lang="en-US" dirty="0" smtClean="0"/>
+              <a:t> </a:t>
+            </a:r>
+            <a:r>
+              <a:rPr lang="en-US" dirty="0" err="1" smtClean="0"/>
+              <a:t>dez</a:t>
+            </a:r>
+            <a:r>
+              <a:rPr lang="en-US" dirty="0" smtClean="0"/>
+              <a:t>. Como </a:t>
+            </a:r>
+            <a:r>
+              <a:rPr lang="en-US" dirty="0" err="1" smtClean="0"/>
+              <a:t>os</a:t>
+            </a:r>
+            <a:r>
+              <a:rPr lang="en-US" dirty="0" smtClean="0"/>
+              <a:t> </a:t>
+            </a:r>
+            <a:r>
+              <a:rPr lang="en-US" dirty="0" err="1" smtClean="0"/>
+              <a:t>membros</a:t>
+            </a:r>
+            <a:r>
+              <a:rPr lang="en-US" dirty="0" smtClean="0"/>
+              <a:t> da </a:t>
+            </a:r>
+            <a:r>
+              <a:rPr lang="en-US" dirty="0" err="1" smtClean="0"/>
+              <a:t>classe</a:t>
+            </a:r>
+            <a:r>
+              <a:rPr lang="en-US" dirty="0" smtClean="0"/>
+              <a:t> </a:t>
+            </a:r>
+            <a:r>
+              <a:rPr lang="en-US" dirty="0" err="1" smtClean="0"/>
+              <a:t>Avaliacao</a:t>
+            </a:r>
+            <a:r>
+              <a:rPr lang="en-US" dirty="0" smtClean="0"/>
+              <a:t> </a:t>
+            </a:r>
+            <a:r>
+              <a:rPr lang="en-US" dirty="0" err="1" smtClean="0"/>
+              <a:t>são</a:t>
+            </a:r>
+            <a:r>
+              <a:rPr lang="en-US" dirty="0" smtClean="0"/>
+              <a:t> </a:t>
+            </a:r>
+            <a:r>
+              <a:rPr lang="en-US" dirty="0" err="1" smtClean="0"/>
+              <a:t>todos</a:t>
+            </a:r>
+            <a:r>
+              <a:rPr lang="en-US" dirty="0" smtClean="0"/>
+              <a:t> </a:t>
+            </a:r>
+            <a:r>
+              <a:rPr lang="en-US" dirty="0" err="1" smtClean="0"/>
+              <a:t>públicos</a:t>
+            </a:r>
+            <a:r>
+              <a:rPr lang="en-US" dirty="0" smtClean="0"/>
+              <a:t>, a </a:t>
+            </a:r>
+            <a:r>
+              <a:rPr lang="en-US" dirty="0" err="1" smtClean="0"/>
+              <a:t>consistência</a:t>
+            </a:r>
+            <a:r>
+              <a:rPr lang="en-US" dirty="0" smtClean="0"/>
+              <a:t> dos </a:t>
+            </a:r>
+            <a:r>
+              <a:rPr lang="en-US" dirty="0" err="1" smtClean="0"/>
+              <a:t>objetos</a:t>
+            </a:r>
+            <a:r>
+              <a:rPr lang="en-US" dirty="0" smtClean="0"/>
+              <a:t> </a:t>
+            </a:r>
+            <a:r>
+              <a:rPr lang="en-US" dirty="0" err="1" smtClean="0"/>
+              <a:t>é</a:t>
+            </a:r>
+            <a:r>
+              <a:rPr lang="en-US" dirty="0" smtClean="0"/>
+              <a:t> </a:t>
+            </a:r>
+            <a:r>
+              <a:rPr lang="en-US" dirty="0" err="1" smtClean="0"/>
+              <a:t>muito</a:t>
+            </a:r>
+            <a:r>
+              <a:rPr lang="en-US" dirty="0" smtClean="0"/>
+              <a:t> </a:t>
+            </a:r>
+            <a:r>
+              <a:rPr lang="en-US" dirty="0" err="1" smtClean="0"/>
+              <a:t>frágil</a:t>
+            </a:r>
+            <a:r>
+              <a:rPr lang="en-US" dirty="0" smtClean="0"/>
+              <a:t>.</a:t>
+            </a:r>
+            <a:endParaRPr lang="en-US" dirty="0"/>
+          </a:p>
+        </p:txBody>
+      </p:sp>
+    </p:spTree>
+    <p:extLst>
+      <p:ext uri="{BB962C8B-B14F-4D97-AF65-F5344CB8AC3E}">
+        <p14:creationId xmlns:p14="http://schemas.microsoft.com/office/powerpoint/2010/main" val="85697686"/>
+      </p:ext>
+    </p:extLst>
+  </p:cSld>
+  <p:clrMapOvr>
+    <a:masterClrMapping/>
+  </p:clrMapOvr>
+</p:sld>
+</file>
+
+<file path=ppt/slides/slide32.xml><?xml version="1.0" encoding="utf-8"?>
+<p:sld xmlns:a="http://schemas.openxmlformats.org/drawingml/2006/main" xmlns:r="http://schemas.openxmlformats.org/officeDocument/2006/relationships" xmlns:p="http://schemas.openxmlformats.org/presentationml/2006/main">
+  <p:cSld>
+    <p:spTree>
+      <p:nvGrpSpPr>
+        <p:cNvPr id="1" name=""/>
+        <p:cNvGrpSpPr/>
+        <p:nvPr/>
+      </p:nvGrpSpPr>
+      <p:grpSpPr>
+        <a:xfrm>
+          <a:off x="0" y="0"/>
+          <a:ext cx="0" cy="0"/>
+          <a:chOff x="0" y="0"/>
+          <a:chExt cx="0" cy="0"/>
+        </a:xfrm>
+      </p:grpSpPr>
+      <p:sp>
+        <p:nvSpPr>
+          <p:cNvPr id="2" name="Title 1"/>
+          <p:cNvSpPr>
+            <a:spLocks noGrp="1"/>
+          </p:cNvSpPr>
+          <p:nvPr>
+            <p:ph type="title"/>
+          </p:nvPr>
+        </p:nvSpPr>
+        <p:spPr/>
+        <p:txBody>
+          <a:bodyPr>
+            <a:normAutofit fontScale="90000"/>
+          </a:bodyPr>
+          <a:lstStyle/>
+          <a:p>
+            <a:r>
+              <a:rPr lang="en-US" dirty="0" err="1"/>
+              <a:t>Acessibilidade</a:t>
+            </a:r>
+            <a:r>
+              <a:rPr lang="en-US" dirty="0"/>
+              <a:t> dos </a:t>
+            </a:r>
+            <a:r>
+              <a:rPr lang="en-US" dirty="0" err="1"/>
+              <a:t>membros</a:t>
+            </a:r>
+            <a:r>
+              <a:rPr lang="en-US" dirty="0"/>
+              <a:t> de </a:t>
+            </a:r>
+            <a:r>
+              <a:rPr lang="en-US" dirty="0" err="1"/>
+              <a:t>uma</a:t>
+            </a:r>
+            <a:r>
+              <a:rPr lang="en-US" dirty="0"/>
+              <a:t> </a:t>
+            </a:r>
+            <a:r>
+              <a:rPr lang="en-US" dirty="0" err="1"/>
+              <a:t>classe</a:t>
+            </a:r>
+            <a:endParaRPr lang="en-US" dirty="0"/>
+          </a:p>
+        </p:txBody>
+      </p:sp>
+      <p:sp>
+        <p:nvSpPr>
+          <p:cNvPr id="3" name="Content Placeholder 2"/>
+          <p:cNvSpPr>
+            <a:spLocks noGrp="1"/>
+          </p:cNvSpPr>
+          <p:nvPr>
+            <p:ph idx="1"/>
+          </p:nvPr>
+        </p:nvSpPr>
+        <p:spPr/>
+        <p:txBody>
+          <a:bodyPr/>
+          <a:lstStyle/>
+          <a:p>
+            <a:r>
+              <a:rPr lang="en-US" dirty="0" smtClean="0"/>
+              <a:t>Para </a:t>
+            </a:r>
+            <a:r>
+              <a:rPr lang="en-US" dirty="0" err="1" smtClean="0"/>
+              <a:t>contornar</a:t>
+            </a:r>
+            <a:r>
+              <a:rPr lang="en-US" dirty="0" smtClean="0"/>
+              <a:t> </a:t>
+            </a:r>
+            <a:r>
+              <a:rPr lang="en-US" dirty="0" err="1" smtClean="0"/>
+              <a:t>isso</a:t>
+            </a:r>
+            <a:r>
+              <a:rPr lang="en-US" dirty="0" smtClean="0"/>
+              <a:t>, a </a:t>
+            </a:r>
+            <a:r>
+              <a:rPr lang="en-US" dirty="0" err="1" smtClean="0"/>
+              <a:t>Orienta</a:t>
+            </a:r>
+            <a:r>
+              <a:rPr lang="en-US" dirty="0" err="1" smtClean="0"/>
+              <a:t>ção</a:t>
+            </a:r>
+            <a:r>
+              <a:rPr lang="en-US" dirty="0" smtClean="0"/>
+              <a:t> a </a:t>
+            </a:r>
+            <a:r>
+              <a:rPr lang="en-US" dirty="0" err="1" smtClean="0"/>
+              <a:t>Objetos</a:t>
+            </a:r>
+            <a:r>
+              <a:rPr lang="en-US" dirty="0" smtClean="0"/>
+              <a:t> define </a:t>
+            </a:r>
+            <a:r>
+              <a:rPr lang="en-US" dirty="0" err="1" smtClean="0"/>
+              <a:t>outras</a:t>
+            </a:r>
+            <a:r>
+              <a:rPr lang="en-US" dirty="0" smtClean="0"/>
+              <a:t> </a:t>
+            </a:r>
+            <a:r>
+              <a:rPr lang="en-US" dirty="0" err="1" smtClean="0"/>
+              <a:t>formas</a:t>
+            </a:r>
+            <a:r>
+              <a:rPr lang="en-US" dirty="0" smtClean="0"/>
+              <a:t> de </a:t>
+            </a:r>
+            <a:r>
+              <a:rPr lang="en-US" dirty="0" err="1" smtClean="0"/>
+              <a:t>acessibilidade</a:t>
+            </a:r>
+            <a:r>
+              <a:rPr lang="en-US" dirty="0" smtClean="0"/>
+              <a:t> </a:t>
+            </a:r>
+            <a:r>
+              <a:rPr lang="en-US" dirty="0" err="1" smtClean="0"/>
+              <a:t>aos</a:t>
+            </a:r>
+            <a:r>
+              <a:rPr lang="en-US" dirty="0" smtClean="0"/>
+              <a:t> </a:t>
+            </a:r>
+            <a:r>
+              <a:rPr lang="en-US" dirty="0" err="1" smtClean="0"/>
+              <a:t>membros</a:t>
+            </a:r>
+            <a:r>
+              <a:rPr lang="en-US" dirty="0" smtClean="0"/>
+              <a:t> de </a:t>
+            </a:r>
+            <a:r>
+              <a:rPr lang="en-US" dirty="0" err="1" smtClean="0"/>
+              <a:t>uma</a:t>
+            </a:r>
+            <a:r>
+              <a:rPr lang="en-US" dirty="0" smtClean="0"/>
+              <a:t> </a:t>
+            </a:r>
+            <a:r>
+              <a:rPr lang="en-US" dirty="0" err="1" smtClean="0"/>
+              <a:t>classe</a:t>
+            </a:r>
+            <a:r>
+              <a:rPr lang="en-US" dirty="0" smtClean="0"/>
+              <a:t>, </a:t>
+            </a:r>
+            <a:r>
+              <a:rPr lang="en-US" dirty="0" err="1" smtClean="0"/>
+              <a:t>através</a:t>
+            </a:r>
+            <a:r>
+              <a:rPr lang="en-US" dirty="0" smtClean="0"/>
+              <a:t> dos </a:t>
+            </a:r>
+            <a:r>
+              <a:rPr lang="en-US" dirty="0" err="1" smtClean="0"/>
+              <a:t>modificadores</a:t>
+            </a:r>
+            <a:r>
+              <a:rPr lang="en-US" dirty="0" smtClean="0"/>
+              <a:t> </a:t>
+            </a:r>
+            <a:r>
+              <a:rPr lang="en-US" b="1" dirty="0" smtClean="0"/>
+              <a:t>final</a:t>
+            </a:r>
+            <a:r>
+              <a:rPr lang="en-US" dirty="0" smtClean="0"/>
+              <a:t>, </a:t>
+            </a:r>
+            <a:r>
+              <a:rPr lang="en-US" b="1" dirty="0" smtClean="0"/>
+              <a:t>protected</a:t>
+            </a:r>
+            <a:r>
+              <a:rPr lang="en-US" dirty="0" smtClean="0"/>
+              <a:t>, e </a:t>
+            </a:r>
+            <a:r>
+              <a:rPr lang="en-US" b="1" dirty="0" smtClean="0"/>
+              <a:t>private</a:t>
+            </a:r>
+            <a:r>
+              <a:rPr lang="en-US" dirty="0" smtClean="0"/>
+              <a:t>. </a:t>
+            </a:r>
+            <a:r>
+              <a:rPr lang="en-US" dirty="0" err="1" smtClean="0"/>
+              <a:t>Através</a:t>
+            </a:r>
+            <a:r>
+              <a:rPr lang="en-US" dirty="0" smtClean="0"/>
+              <a:t> </a:t>
+            </a:r>
+            <a:r>
+              <a:rPr lang="en-US" dirty="0" err="1" smtClean="0"/>
+              <a:t>desses</a:t>
+            </a:r>
+            <a:r>
+              <a:rPr lang="en-US" dirty="0" smtClean="0"/>
+              <a:t> </a:t>
+            </a:r>
+            <a:r>
+              <a:rPr lang="en-US" dirty="0" err="1" smtClean="0"/>
+              <a:t>modificadores</a:t>
+            </a:r>
+            <a:r>
+              <a:rPr lang="en-US" dirty="0" smtClean="0"/>
+              <a:t>, o </a:t>
+            </a:r>
+            <a:r>
+              <a:rPr lang="en-US" dirty="0" err="1" smtClean="0"/>
+              <a:t>programador</a:t>
+            </a:r>
+            <a:r>
+              <a:rPr lang="en-US" dirty="0"/>
+              <a:t> </a:t>
+            </a:r>
+            <a:r>
+              <a:rPr lang="en-US" dirty="0" err="1" smtClean="0"/>
+              <a:t>pode</a:t>
+            </a:r>
+            <a:r>
+              <a:rPr lang="en-US" dirty="0" smtClean="0"/>
+              <a:t> </a:t>
+            </a:r>
+            <a:r>
+              <a:rPr lang="en-US" dirty="0" err="1" smtClean="0"/>
+              <a:t>encapsular</a:t>
+            </a:r>
+            <a:r>
+              <a:rPr lang="en-US" dirty="0" smtClean="0"/>
+              <a:t> </a:t>
+            </a:r>
+            <a:r>
+              <a:rPr lang="en-US" dirty="0" err="1" smtClean="0"/>
+              <a:t>os</a:t>
+            </a:r>
+            <a:r>
+              <a:rPr lang="en-US" dirty="0" smtClean="0"/>
+              <a:t> </a:t>
+            </a:r>
+            <a:r>
+              <a:rPr lang="en-US" dirty="0" err="1" smtClean="0"/>
+              <a:t>membros</a:t>
+            </a:r>
+            <a:r>
+              <a:rPr lang="en-US" dirty="0" smtClean="0"/>
+              <a:t> de </a:t>
+            </a:r>
+            <a:r>
+              <a:rPr lang="en-US" dirty="0" err="1" smtClean="0"/>
+              <a:t>uma</a:t>
+            </a:r>
+            <a:r>
+              <a:rPr lang="en-US" dirty="0" smtClean="0"/>
+              <a:t> </a:t>
+            </a:r>
+            <a:r>
+              <a:rPr lang="en-US" dirty="0" err="1" smtClean="0"/>
+              <a:t>classe</a:t>
+            </a:r>
+            <a:r>
+              <a:rPr lang="en-US" dirty="0" smtClean="0"/>
+              <a:t>, de forma a </a:t>
+            </a:r>
+            <a:r>
+              <a:rPr lang="en-US" dirty="0" err="1" smtClean="0"/>
+              <a:t>garantir</a:t>
+            </a:r>
+            <a:r>
+              <a:rPr lang="en-US" dirty="0" smtClean="0"/>
+              <a:t> a </a:t>
+            </a:r>
+            <a:r>
+              <a:rPr lang="en-US" dirty="0" err="1" smtClean="0"/>
+              <a:t>sua</a:t>
+            </a:r>
+            <a:r>
+              <a:rPr lang="en-US" dirty="0" smtClean="0"/>
+              <a:t> </a:t>
+            </a:r>
+            <a:r>
+              <a:rPr lang="en-US" dirty="0" err="1" smtClean="0"/>
+              <a:t>consistência</a:t>
+            </a:r>
+            <a:endParaRPr lang="en-US" dirty="0"/>
+          </a:p>
+        </p:txBody>
+      </p:sp>
+    </p:spTree>
+    <p:extLst>
+      <p:ext uri="{BB962C8B-B14F-4D97-AF65-F5344CB8AC3E}">
+        <p14:creationId xmlns:p14="http://schemas.microsoft.com/office/powerpoint/2010/main" val="2249282312"/>
+      </p:ext>
+    </p:extLst>
+  </p:cSld>
+  <p:clrMapOvr>
+    <a:masterClrMapping/>
+  </p:clrMapOvr>
+</p:sld>
+</file>
+
+<file path=ppt/slides/slide33.xml><?xml version="1.0" encoding="utf-8"?>
+<p:sld xmlns:a="http://schemas.openxmlformats.org/drawingml/2006/main" xmlns:r="http://schemas.openxmlformats.org/officeDocument/2006/relationships" xmlns:p="http://schemas.openxmlformats.org/presentationml/2006/main">
+  <p:cSld>
+    <p:spTree>
+      <p:nvGrpSpPr>
+        <p:cNvPr id="1" name=""/>
+        <p:cNvGrpSpPr/>
+        <p:nvPr/>
+      </p:nvGrpSpPr>
+      <p:grpSpPr>
+        <a:xfrm>
+          <a:off x="0" y="0"/>
+          <a:ext cx="0" cy="0"/>
+          <a:chOff x="0" y="0"/>
+          <a:chExt cx="0" cy="0"/>
+        </a:xfrm>
+      </p:grpSpPr>
+      <p:sp>
+        <p:nvSpPr>
+          <p:cNvPr id="2" name="Title 1"/>
+          <p:cNvSpPr>
+            <a:spLocks noGrp="1"/>
+          </p:cNvSpPr>
+          <p:nvPr>
+            <p:ph type="title"/>
+          </p:nvPr>
+        </p:nvSpPr>
+        <p:spPr/>
+        <p:txBody>
+          <a:bodyPr>
+            <a:normAutofit fontScale="90000"/>
+          </a:bodyPr>
+          <a:lstStyle/>
+          <a:p>
+            <a:r>
+              <a:rPr lang="en-US" dirty="0" err="1"/>
+              <a:t>Acessibilidade</a:t>
+            </a:r>
+            <a:r>
+              <a:rPr lang="en-US" dirty="0"/>
+              <a:t> dos </a:t>
+            </a:r>
+            <a:r>
+              <a:rPr lang="en-US" dirty="0" err="1"/>
+              <a:t>membros</a:t>
+            </a:r>
+            <a:r>
+              <a:rPr lang="en-US" dirty="0"/>
+              <a:t> de </a:t>
+            </a:r>
+            <a:r>
+              <a:rPr lang="en-US" dirty="0" err="1"/>
+              <a:t>uma</a:t>
+            </a:r>
+            <a:r>
+              <a:rPr lang="en-US" dirty="0"/>
+              <a:t> </a:t>
+            </a:r>
+            <a:r>
+              <a:rPr lang="en-US" dirty="0" err="1"/>
+              <a:t>classe</a:t>
+            </a:r>
+            <a:endParaRPr lang="en-US" dirty="0"/>
+          </a:p>
+        </p:txBody>
+      </p:sp>
+      <p:sp>
+        <p:nvSpPr>
+          <p:cNvPr id="3" name="Content Placeholder 2"/>
+          <p:cNvSpPr>
+            <a:spLocks noGrp="1"/>
+          </p:cNvSpPr>
+          <p:nvPr>
+            <p:ph idx="1"/>
+          </p:nvPr>
+        </p:nvSpPr>
+        <p:spPr/>
+        <p:txBody>
+          <a:bodyPr/>
+          <a:lstStyle/>
+          <a:p>
+            <a:r>
+              <a:rPr lang="en-US" dirty="0" err="1" smtClean="0"/>
+              <a:t>P</a:t>
+            </a:r>
+            <a:r>
+              <a:rPr lang="en-US" dirty="0" err="1" smtClean="0"/>
+              <a:t>úblico</a:t>
+            </a:r>
+            <a:r>
+              <a:rPr lang="en-US" dirty="0" smtClean="0"/>
+              <a:t> / </a:t>
+            </a:r>
+            <a:r>
+              <a:rPr lang="en-US" b="1" dirty="0" smtClean="0"/>
+              <a:t>public</a:t>
+            </a:r>
+          </a:p>
+          <a:p>
+            <a:pPr lvl="1"/>
+            <a:r>
+              <a:rPr lang="en-US" dirty="0" err="1" smtClean="0"/>
+              <a:t>É</a:t>
+            </a:r>
+            <a:r>
+              <a:rPr lang="en-US" dirty="0" smtClean="0"/>
+              <a:t> </a:t>
+            </a:r>
+            <a:r>
+              <a:rPr lang="en-US" dirty="0" err="1" smtClean="0"/>
+              <a:t>acessível</a:t>
+            </a:r>
+            <a:r>
+              <a:rPr lang="en-US" dirty="0" smtClean="0"/>
+              <a:t> </a:t>
+            </a:r>
+            <a:r>
+              <a:rPr lang="en-US" dirty="0" err="1" smtClean="0"/>
+              <a:t>por</a:t>
+            </a:r>
+            <a:r>
+              <a:rPr lang="en-US" dirty="0" smtClean="0"/>
+              <a:t> </a:t>
+            </a:r>
+            <a:r>
+              <a:rPr lang="en-US" dirty="0" err="1" smtClean="0"/>
+              <a:t>qualquer</a:t>
+            </a:r>
+            <a:r>
+              <a:rPr lang="en-US" dirty="0" smtClean="0"/>
+              <a:t> </a:t>
+            </a:r>
+            <a:r>
+              <a:rPr lang="en-US" dirty="0" err="1" smtClean="0"/>
+              <a:t>objeto</a:t>
+            </a:r>
+            <a:r>
+              <a:rPr lang="en-US" dirty="0" smtClean="0"/>
+              <a:t> </a:t>
+            </a:r>
+            <a:r>
+              <a:rPr lang="en-US" dirty="0" err="1" smtClean="0"/>
+              <a:t>instanciado</a:t>
+            </a:r>
+            <a:r>
+              <a:rPr lang="en-US" dirty="0" smtClean="0"/>
+              <a:t> </a:t>
+            </a:r>
+            <a:r>
+              <a:rPr lang="en-US" dirty="0" err="1" smtClean="0"/>
+              <a:t>na</a:t>
+            </a:r>
+            <a:r>
+              <a:rPr lang="en-US" dirty="0" smtClean="0"/>
+              <a:t> </a:t>
+            </a:r>
+            <a:r>
+              <a:rPr lang="en-US" dirty="0" err="1" smtClean="0"/>
+              <a:t>máquina</a:t>
+            </a:r>
+            <a:r>
+              <a:rPr lang="en-US" dirty="0" smtClean="0"/>
+              <a:t> virtual. </a:t>
+            </a:r>
+            <a:r>
+              <a:rPr lang="en-US" dirty="0" err="1" smtClean="0"/>
+              <a:t>Normalmente</a:t>
+            </a:r>
+            <a:r>
+              <a:rPr lang="en-US" dirty="0" smtClean="0"/>
+              <a:t> </a:t>
+            </a:r>
+            <a:r>
+              <a:rPr lang="en-US" dirty="0" err="1" smtClean="0"/>
+              <a:t>declaramos</a:t>
+            </a:r>
+            <a:r>
+              <a:rPr lang="en-US" dirty="0" smtClean="0"/>
+              <a:t> </a:t>
+            </a:r>
+            <a:r>
+              <a:rPr lang="en-US" dirty="0" err="1" smtClean="0"/>
+              <a:t>públicos</a:t>
+            </a:r>
+            <a:r>
+              <a:rPr lang="en-US" dirty="0" smtClean="0"/>
+              <a:t> </a:t>
+            </a:r>
+            <a:r>
+              <a:rPr lang="en-US" dirty="0" err="1" smtClean="0"/>
+              <a:t>apenas</a:t>
+            </a:r>
+            <a:r>
+              <a:rPr lang="en-US" dirty="0" smtClean="0"/>
+              <a:t> </a:t>
+            </a:r>
+            <a:r>
+              <a:rPr lang="en-US" dirty="0" err="1" smtClean="0"/>
+              <a:t>alguns</a:t>
+            </a:r>
+            <a:r>
+              <a:rPr lang="en-US" dirty="0" smtClean="0"/>
+              <a:t> </a:t>
+            </a:r>
+            <a:r>
+              <a:rPr lang="en-US" dirty="0" err="1" smtClean="0"/>
+              <a:t>métodos</a:t>
+            </a:r>
+            <a:r>
+              <a:rPr lang="en-US" dirty="0" smtClean="0"/>
+              <a:t> de </a:t>
+            </a:r>
+            <a:r>
+              <a:rPr lang="en-US" dirty="0" err="1" smtClean="0"/>
+              <a:t>uma</a:t>
+            </a:r>
+            <a:r>
+              <a:rPr lang="en-US" dirty="0" smtClean="0"/>
+              <a:t> </a:t>
+            </a:r>
+            <a:r>
+              <a:rPr lang="en-US" dirty="0" err="1" smtClean="0"/>
+              <a:t>classe</a:t>
+            </a:r>
+            <a:r>
+              <a:rPr lang="en-US" dirty="0" smtClean="0"/>
+              <a:t>. </a:t>
+            </a:r>
+            <a:r>
+              <a:rPr lang="en-US" dirty="0" err="1" smtClean="0"/>
+              <a:t>Os</a:t>
+            </a:r>
+            <a:r>
+              <a:rPr lang="en-US" dirty="0" smtClean="0"/>
+              <a:t> </a:t>
+            </a:r>
+            <a:r>
+              <a:rPr lang="en-US" dirty="0" err="1" smtClean="0"/>
+              <a:t>membros</a:t>
+            </a:r>
+            <a:r>
+              <a:rPr lang="en-US" dirty="0" smtClean="0"/>
+              <a:t> 	</a:t>
+            </a:r>
+            <a:r>
+              <a:rPr lang="en-US" dirty="0" err="1" smtClean="0"/>
+              <a:t>variáveis</a:t>
+            </a:r>
+            <a:r>
+              <a:rPr lang="en-US" dirty="0" smtClean="0"/>
+              <a:t> </a:t>
+            </a:r>
+            <a:r>
+              <a:rPr lang="en-US" dirty="0" err="1" smtClean="0"/>
+              <a:t>são</a:t>
+            </a:r>
+            <a:r>
+              <a:rPr lang="en-US" dirty="0" smtClean="0"/>
+              <a:t> </a:t>
+            </a:r>
+            <a:r>
+              <a:rPr lang="en-US" dirty="0" err="1" smtClean="0"/>
+              <a:t>todos</a:t>
+            </a:r>
+            <a:r>
+              <a:rPr lang="en-US" dirty="0" smtClean="0"/>
+              <a:t> </a:t>
+            </a:r>
+            <a:r>
+              <a:rPr lang="en-US" dirty="0" err="1" smtClean="0"/>
+              <a:t>declarados</a:t>
+            </a:r>
+            <a:r>
+              <a:rPr lang="en-US" dirty="0" smtClean="0"/>
+              <a:t> </a:t>
+            </a:r>
+            <a:r>
+              <a:rPr lang="en-US" dirty="0" err="1" smtClean="0"/>
+              <a:t>privados</a:t>
+            </a:r>
+            <a:r>
+              <a:rPr lang="en-US" dirty="0" smtClean="0"/>
+              <a:t>, salvo </a:t>
+            </a:r>
+            <a:r>
+              <a:rPr lang="en-US" dirty="0" err="1" smtClean="0"/>
+              <a:t>raras</a:t>
+            </a:r>
+            <a:r>
+              <a:rPr lang="en-US" dirty="0" smtClean="0"/>
+              <a:t> </a:t>
+            </a:r>
+            <a:r>
+              <a:rPr lang="en-US" dirty="0" err="1" smtClean="0"/>
+              <a:t>exceções</a:t>
+            </a:r>
+            <a:r>
+              <a:rPr lang="en-US" dirty="0" smtClean="0"/>
+              <a:t>.</a:t>
+            </a:r>
+            <a:endParaRPr lang="en-US" dirty="0"/>
+          </a:p>
+        </p:txBody>
+      </p:sp>
+    </p:spTree>
+    <p:extLst>
+      <p:ext uri="{BB962C8B-B14F-4D97-AF65-F5344CB8AC3E}">
+        <p14:creationId xmlns:p14="http://schemas.microsoft.com/office/powerpoint/2010/main" val="2372457818"/>
+      </p:ext>
+    </p:extLst>
+  </p:cSld>
+  <p:clrMapOvr>
+    <a:masterClrMapping/>
+  </p:clrMapOvr>
+</p:sld>
+</file>
+
+<file path=ppt/slides/slide34.xml><?xml version="1.0" encoding="utf-8"?>
+<p:sld xmlns:a="http://schemas.openxmlformats.org/drawingml/2006/main" xmlns:r="http://schemas.openxmlformats.org/officeDocument/2006/relationships" xmlns:p="http://schemas.openxmlformats.org/presentationml/2006/main">
+  <p:cSld>
+    <p:spTree>
+      <p:nvGrpSpPr>
+        <p:cNvPr id="1" name=""/>
+        <p:cNvGrpSpPr/>
+        <p:nvPr/>
+      </p:nvGrpSpPr>
+      <p:grpSpPr>
+        <a:xfrm>
+          <a:off x="0" y="0"/>
+          <a:ext cx="0" cy="0"/>
+          <a:chOff x="0" y="0"/>
+          <a:chExt cx="0" cy="0"/>
+        </a:xfrm>
+      </p:grpSpPr>
+      <p:sp>
+        <p:nvSpPr>
+          <p:cNvPr id="2" name="Title 1"/>
+          <p:cNvSpPr>
+            <a:spLocks noGrp="1"/>
+          </p:cNvSpPr>
+          <p:nvPr>
+            <p:ph type="title"/>
+          </p:nvPr>
+        </p:nvSpPr>
+        <p:spPr/>
+        <p:txBody>
+          <a:bodyPr>
+            <a:normAutofit fontScale="90000"/>
+          </a:bodyPr>
+          <a:lstStyle/>
+          <a:p>
+            <a:r>
+              <a:rPr lang="en-US" dirty="0" err="1"/>
+              <a:t>Acessibilidade</a:t>
+            </a:r>
+            <a:r>
+              <a:rPr lang="en-US" dirty="0"/>
+              <a:t> dos </a:t>
+            </a:r>
+            <a:r>
+              <a:rPr lang="en-US" dirty="0" err="1"/>
+              <a:t>membros</a:t>
+            </a:r>
+            <a:r>
+              <a:rPr lang="en-US" dirty="0"/>
+              <a:t> de </a:t>
+            </a:r>
+            <a:r>
+              <a:rPr lang="en-US" dirty="0" err="1"/>
+              <a:t>uma</a:t>
+            </a:r>
+            <a:r>
+              <a:rPr lang="en-US" dirty="0"/>
+              <a:t> </a:t>
+            </a:r>
+            <a:r>
+              <a:rPr lang="en-US" dirty="0" err="1"/>
+              <a:t>classe</a:t>
+            </a:r>
+            <a:endParaRPr lang="en-US" dirty="0"/>
+          </a:p>
+        </p:txBody>
+      </p:sp>
+      <p:sp>
+        <p:nvSpPr>
+          <p:cNvPr id="3" name="Content Placeholder 2"/>
+          <p:cNvSpPr>
+            <a:spLocks noGrp="1"/>
+          </p:cNvSpPr>
+          <p:nvPr>
+            <p:ph idx="1"/>
+          </p:nvPr>
+        </p:nvSpPr>
+        <p:spPr/>
+        <p:txBody>
+          <a:bodyPr/>
+          <a:lstStyle/>
+          <a:p>
+            <a:r>
+              <a:rPr lang="en-US" dirty="0" err="1" smtClean="0"/>
+              <a:t>Privado</a:t>
+            </a:r>
+            <a:r>
+              <a:rPr lang="en-US" dirty="0" smtClean="0"/>
+              <a:t> / </a:t>
+            </a:r>
+            <a:r>
+              <a:rPr lang="en-US" b="1" dirty="0" smtClean="0"/>
+              <a:t>private</a:t>
+            </a:r>
+          </a:p>
+          <a:p>
+            <a:pPr lvl="1"/>
+            <a:r>
+              <a:rPr lang="en-US" dirty="0" err="1" smtClean="0"/>
+              <a:t>É</a:t>
+            </a:r>
+            <a:r>
+              <a:rPr lang="en-US" dirty="0" smtClean="0"/>
+              <a:t> </a:t>
+            </a:r>
+            <a:r>
+              <a:rPr lang="en-US" dirty="0" err="1" smtClean="0"/>
+              <a:t>acessível</a:t>
+            </a:r>
+            <a:r>
+              <a:rPr lang="en-US" dirty="0" smtClean="0"/>
+              <a:t> </a:t>
+            </a:r>
+            <a:r>
+              <a:rPr lang="en-US" dirty="0" err="1" smtClean="0"/>
+              <a:t>somente</a:t>
+            </a:r>
+            <a:r>
+              <a:rPr lang="en-US" dirty="0" smtClean="0"/>
+              <a:t> </a:t>
+            </a:r>
+            <a:r>
+              <a:rPr lang="en-US" dirty="0" err="1" smtClean="0"/>
+              <a:t>por</a:t>
+            </a:r>
+            <a:r>
+              <a:rPr lang="en-US" dirty="0" smtClean="0"/>
+              <a:t> </a:t>
+            </a:r>
+            <a:r>
+              <a:rPr lang="en-US" dirty="0" err="1" smtClean="0"/>
+              <a:t>métodos</a:t>
+            </a:r>
+            <a:r>
+              <a:rPr lang="en-US" dirty="0" smtClean="0"/>
+              <a:t> da </a:t>
+            </a:r>
+            <a:r>
+              <a:rPr lang="en-US" dirty="0" err="1" smtClean="0"/>
+              <a:t>própria</a:t>
+            </a:r>
+            <a:r>
+              <a:rPr lang="en-US" dirty="0" smtClean="0"/>
+              <a:t> </a:t>
+            </a:r>
+            <a:r>
+              <a:rPr lang="en-US" dirty="0" err="1" smtClean="0"/>
+              <a:t>classe</a:t>
+            </a:r>
+            <a:r>
+              <a:rPr lang="en-US" dirty="0" smtClean="0"/>
+              <a:t> </a:t>
+            </a:r>
+            <a:r>
+              <a:rPr lang="en-US" dirty="0" err="1" smtClean="0"/>
+              <a:t>onde</a:t>
+            </a:r>
+            <a:r>
+              <a:rPr lang="en-US" dirty="0" smtClean="0"/>
+              <a:t> o </a:t>
+            </a:r>
+            <a:r>
+              <a:rPr lang="en-US" dirty="0" err="1" smtClean="0"/>
+              <a:t>membro</a:t>
+            </a:r>
+            <a:r>
+              <a:rPr lang="en-US" dirty="0" smtClean="0"/>
+              <a:t> </a:t>
+            </a:r>
+            <a:r>
+              <a:rPr lang="en-US" dirty="0" err="1" smtClean="0"/>
+              <a:t>foi</a:t>
+            </a:r>
+            <a:r>
+              <a:rPr lang="en-US" dirty="0" smtClean="0"/>
+              <a:t> </a:t>
+            </a:r>
+            <a:r>
+              <a:rPr lang="en-US" dirty="0" err="1" smtClean="0"/>
+              <a:t>declarado</a:t>
+            </a:r>
+            <a:r>
+              <a:rPr lang="en-US" dirty="0" smtClean="0"/>
+              <a:t>.</a:t>
+            </a:r>
+            <a:endParaRPr lang="en-US" dirty="0"/>
+          </a:p>
+        </p:txBody>
+      </p:sp>
+    </p:spTree>
+    <p:extLst>
+      <p:ext uri="{BB962C8B-B14F-4D97-AF65-F5344CB8AC3E}">
+        <p14:creationId xmlns:p14="http://schemas.microsoft.com/office/powerpoint/2010/main" val="1849125298"/>
+      </p:ext>
+    </p:extLst>
+  </p:cSld>
+  <p:clrMapOvr>
+    <a:masterClrMapping/>
+  </p:clrMapOvr>
+</p:sld>
+</file>
+
+<file path=ppt/slides/slide35.xml><?xml version="1.0" encoding="utf-8"?>
+<p:sld xmlns:a="http://schemas.openxmlformats.org/drawingml/2006/main" xmlns:r="http://schemas.openxmlformats.org/officeDocument/2006/relationships" xmlns:p="http://schemas.openxmlformats.org/presentationml/2006/main">
+  <p:cSld>
+    <p:spTree>
+      <p:nvGrpSpPr>
+        <p:cNvPr id="1" name=""/>
+        <p:cNvGrpSpPr/>
+        <p:nvPr/>
+      </p:nvGrpSpPr>
+      <p:grpSpPr>
+        <a:xfrm>
+          <a:off x="0" y="0"/>
+          <a:ext cx="0" cy="0"/>
+          <a:chOff x="0" y="0"/>
+          <a:chExt cx="0" cy="0"/>
+        </a:xfrm>
+      </p:grpSpPr>
+      <p:sp>
+        <p:nvSpPr>
+          <p:cNvPr id="2" name="Title 1"/>
+          <p:cNvSpPr>
+            <a:spLocks noGrp="1"/>
+          </p:cNvSpPr>
+          <p:nvPr>
+            <p:ph type="title"/>
+          </p:nvPr>
+        </p:nvSpPr>
+        <p:spPr/>
+        <p:txBody>
+          <a:bodyPr>
+            <a:normAutofit fontScale="90000"/>
+          </a:bodyPr>
+          <a:lstStyle/>
+          <a:p>
+            <a:r>
+              <a:rPr lang="en-US" dirty="0" err="1"/>
+              <a:t>Acessibilidade</a:t>
+            </a:r>
+            <a:r>
+              <a:rPr lang="en-US" dirty="0"/>
+              <a:t> dos </a:t>
+            </a:r>
+            <a:r>
+              <a:rPr lang="en-US" dirty="0" err="1"/>
+              <a:t>membros</a:t>
+            </a:r>
+            <a:r>
+              <a:rPr lang="en-US" dirty="0"/>
+              <a:t> de </a:t>
+            </a:r>
+            <a:r>
+              <a:rPr lang="en-US" dirty="0" err="1"/>
+              <a:t>uma</a:t>
+            </a:r>
+            <a:r>
+              <a:rPr lang="en-US" dirty="0"/>
+              <a:t> </a:t>
+            </a:r>
+            <a:r>
+              <a:rPr lang="en-US" dirty="0" err="1"/>
+              <a:t>classe</a:t>
+            </a:r>
+            <a:endParaRPr lang="en-US" dirty="0"/>
+          </a:p>
+        </p:txBody>
+      </p:sp>
+      <p:sp>
+        <p:nvSpPr>
+          <p:cNvPr id="3" name="Content Placeholder 2"/>
+          <p:cNvSpPr>
+            <a:spLocks noGrp="1"/>
+          </p:cNvSpPr>
+          <p:nvPr>
+            <p:ph idx="1"/>
+          </p:nvPr>
+        </p:nvSpPr>
+        <p:spPr/>
+        <p:txBody>
+          <a:bodyPr/>
+          <a:lstStyle/>
+          <a:p>
+            <a:r>
+              <a:rPr lang="en-US" dirty="0" err="1" smtClean="0"/>
+              <a:t>Protegido</a:t>
+            </a:r>
+            <a:r>
+              <a:rPr lang="en-US" dirty="0" smtClean="0"/>
+              <a:t> / </a:t>
+            </a:r>
+            <a:r>
+              <a:rPr lang="en-US" b="1" dirty="0" smtClean="0"/>
+              <a:t>protected</a:t>
+            </a:r>
+          </a:p>
+          <a:p>
+            <a:pPr lvl="1"/>
+            <a:r>
+              <a:rPr lang="en-US" dirty="0" err="1" smtClean="0"/>
+              <a:t>É</a:t>
+            </a:r>
+            <a:r>
+              <a:rPr lang="en-US" dirty="0" smtClean="0"/>
+              <a:t> </a:t>
+            </a:r>
+            <a:r>
+              <a:rPr lang="en-US" dirty="0" err="1" smtClean="0"/>
+              <a:t>acessível</a:t>
+            </a:r>
+            <a:r>
+              <a:rPr lang="en-US" dirty="0" smtClean="0"/>
+              <a:t> </a:t>
+            </a:r>
+            <a:r>
+              <a:rPr lang="en-US" dirty="0" err="1" smtClean="0"/>
+              <a:t>somente</a:t>
+            </a:r>
+            <a:r>
+              <a:rPr lang="en-US" dirty="0" smtClean="0"/>
+              <a:t> </a:t>
+            </a:r>
+            <a:r>
+              <a:rPr lang="en-US" dirty="0" err="1" smtClean="0"/>
+              <a:t>por</a:t>
+            </a:r>
+            <a:r>
+              <a:rPr lang="en-US" dirty="0" smtClean="0"/>
+              <a:t> </a:t>
+            </a:r>
+            <a:r>
+              <a:rPr lang="en-US" dirty="0" err="1" smtClean="0"/>
+              <a:t>métodos</a:t>
+            </a:r>
+            <a:r>
+              <a:rPr lang="en-US" dirty="0" smtClean="0"/>
+              <a:t> de subclasses da </a:t>
+            </a:r>
+            <a:r>
+              <a:rPr lang="en-US" dirty="0" err="1" smtClean="0"/>
+              <a:t>classe</a:t>
+            </a:r>
+            <a:r>
+              <a:rPr lang="en-US" dirty="0" smtClean="0"/>
+              <a:t> </a:t>
+            </a:r>
+            <a:r>
+              <a:rPr lang="en-US" dirty="0" err="1" smtClean="0"/>
+              <a:t>onde</a:t>
+            </a:r>
+            <a:r>
+              <a:rPr lang="en-US" dirty="0" smtClean="0"/>
+              <a:t> o </a:t>
+            </a:r>
+            <a:r>
+              <a:rPr lang="en-US" dirty="0" err="1" smtClean="0"/>
+              <a:t>membro</a:t>
+            </a:r>
+            <a:r>
+              <a:rPr lang="en-US" dirty="0" smtClean="0"/>
+              <a:t> </a:t>
+            </a:r>
+            <a:r>
+              <a:rPr lang="en-US" dirty="0" err="1" smtClean="0"/>
+              <a:t>foi</a:t>
+            </a:r>
+            <a:r>
+              <a:rPr lang="en-US" dirty="0" smtClean="0"/>
+              <a:t> </a:t>
+            </a:r>
+            <a:r>
+              <a:rPr lang="en-US" dirty="0" err="1" smtClean="0"/>
+              <a:t>declarado</a:t>
+            </a:r>
+            <a:r>
+              <a:rPr lang="en-US" dirty="0"/>
+              <a:t> </a:t>
+            </a:r>
+            <a:r>
+              <a:rPr lang="en-US" dirty="0" err="1" smtClean="0"/>
+              <a:t>ou</a:t>
+            </a:r>
+            <a:r>
+              <a:rPr lang="en-US" dirty="0" smtClean="0"/>
+              <a:t> da </a:t>
+            </a:r>
+            <a:r>
+              <a:rPr lang="en-US" dirty="0" err="1" smtClean="0"/>
+              <a:t>própria</a:t>
+            </a:r>
+            <a:r>
+              <a:rPr lang="en-US" dirty="0" smtClean="0"/>
+              <a:t> </a:t>
+            </a:r>
+            <a:r>
+              <a:rPr lang="en-US" dirty="0" err="1" smtClean="0"/>
+              <a:t>classe</a:t>
+            </a:r>
+            <a:r>
+              <a:rPr lang="en-US" dirty="0" smtClean="0"/>
+              <a:t> </a:t>
+            </a:r>
+            <a:r>
+              <a:rPr lang="en-US" dirty="0" err="1" smtClean="0"/>
+              <a:t>onde</a:t>
+            </a:r>
+            <a:r>
+              <a:rPr lang="en-US" dirty="0" smtClean="0"/>
+              <a:t> o </a:t>
+            </a:r>
+            <a:r>
+              <a:rPr lang="en-US" dirty="0" err="1" smtClean="0"/>
+              <a:t>membro</a:t>
+            </a:r>
+            <a:r>
+              <a:rPr lang="en-US" dirty="0" smtClean="0"/>
+              <a:t> </a:t>
+            </a:r>
+            <a:r>
+              <a:rPr lang="en-US" dirty="0" err="1" smtClean="0"/>
+              <a:t>foi</a:t>
+            </a:r>
+            <a:r>
+              <a:rPr lang="en-US" dirty="0" smtClean="0"/>
+              <a:t> </a:t>
+            </a:r>
+            <a:r>
+              <a:rPr lang="en-US" dirty="0" err="1" smtClean="0"/>
+              <a:t>declarado</a:t>
+            </a:r>
+            <a:r>
+              <a:rPr lang="en-US" dirty="0" smtClean="0"/>
+              <a:t>.</a:t>
+            </a:r>
+            <a:endParaRPr lang="en-US" dirty="0"/>
+          </a:p>
+        </p:txBody>
+      </p:sp>
+    </p:spTree>
+    <p:extLst>
+      <p:ext uri="{BB962C8B-B14F-4D97-AF65-F5344CB8AC3E}">
+        <p14:creationId xmlns:p14="http://schemas.microsoft.com/office/powerpoint/2010/main" val="1531419555"/>
+      </p:ext>
+    </p:extLst>
+  </p:cSld>
+  <p:clrMapOvr>
+    <a:masterClrMapping/>
+  </p:clrMapOvr>
+</p:sld>
+</file>
+
+<file path=ppt/slides/slide36.xml><?xml version="1.0" encoding="utf-8"?>
+<p:sld xmlns:a="http://schemas.openxmlformats.org/drawingml/2006/main" xmlns:r="http://schemas.openxmlformats.org/officeDocument/2006/relationships" xmlns:p="http://schemas.openxmlformats.org/presentationml/2006/main">
+  <p:cSld>
+    <p:spTree>
+      <p:nvGrpSpPr>
+        <p:cNvPr id="1" name=""/>
+        <p:cNvGrpSpPr/>
+        <p:nvPr/>
+      </p:nvGrpSpPr>
+      <p:grpSpPr>
+        <a:xfrm>
+          <a:off x="0" y="0"/>
+          <a:ext cx="0" cy="0"/>
+          <a:chOff x="0" y="0"/>
+          <a:chExt cx="0" cy="0"/>
+        </a:xfrm>
+      </p:grpSpPr>
+      <p:sp>
+        <p:nvSpPr>
+          <p:cNvPr id="2" name="Title 1"/>
+          <p:cNvSpPr>
+            <a:spLocks noGrp="1"/>
+          </p:cNvSpPr>
+          <p:nvPr>
+            <p:ph type="title"/>
+          </p:nvPr>
+        </p:nvSpPr>
+        <p:spPr/>
+        <p:txBody>
+          <a:bodyPr>
+            <a:normAutofit fontScale="90000"/>
+          </a:bodyPr>
+          <a:lstStyle/>
+          <a:p>
+            <a:r>
+              <a:rPr lang="en-US" dirty="0" err="1"/>
+              <a:t>Acessibilidade</a:t>
+            </a:r>
+            <a:r>
+              <a:rPr lang="en-US" dirty="0"/>
+              <a:t> dos </a:t>
+            </a:r>
+            <a:r>
+              <a:rPr lang="en-US" dirty="0" err="1"/>
+              <a:t>membros</a:t>
+            </a:r>
+            <a:r>
+              <a:rPr lang="en-US" dirty="0"/>
+              <a:t> de </a:t>
+            </a:r>
+            <a:r>
+              <a:rPr lang="en-US" dirty="0" err="1"/>
+              <a:t>uma</a:t>
+            </a:r>
+            <a:r>
+              <a:rPr lang="en-US" dirty="0"/>
+              <a:t> </a:t>
+            </a:r>
+            <a:r>
+              <a:rPr lang="en-US" dirty="0" err="1"/>
+              <a:t>classe</a:t>
+            </a:r>
+            <a:endParaRPr lang="en-US" dirty="0"/>
+          </a:p>
+        </p:txBody>
+      </p:sp>
+      <p:sp>
+        <p:nvSpPr>
+          <p:cNvPr id="3" name="Content Placeholder 2"/>
+          <p:cNvSpPr>
+            <a:spLocks noGrp="1"/>
+          </p:cNvSpPr>
+          <p:nvPr>
+            <p:ph idx="1"/>
+          </p:nvPr>
+        </p:nvSpPr>
+        <p:spPr/>
+        <p:txBody>
+          <a:bodyPr/>
+          <a:lstStyle/>
+          <a:p>
+            <a:r>
+              <a:rPr lang="en-US" dirty="0" err="1" smtClean="0"/>
+              <a:t>Constante</a:t>
+            </a:r>
+            <a:r>
+              <a:rPr lang="en-US" dirty="0" smtClean="0"/>
+              <a:t> /	 final</a:t>
+            </a:r>
+          </a:p>
+          <a:p>
+            <a:pPr lvl="1"/>
+            <a:r>
+              <a:rPr lang="en-US" dirty="0" smtClean="0"/>
+              <a:t>Um </a:t>
+            </a:r>
+            <a:r>
+              <a:rPr lang="en-US" dirty="0" err="1" smtClean="0"/>
+              <a:t>membro</a:t>
+            </a:r>
+            <a:r>
+              <a:rPr lang="en-US" dirty="0" smtClean="0"/>
+              <a:t> </a:t>
+            </a:r>
+            <a:r>
+              <a:rPr lang="en-US" dirty="0" err="1" smtClean="0"/>
+              <a:t>declarado</a:t>
+            </a:r>
+            <a:r>
+              <a:rPr lang="en-US" dirty="0" smtClean="0"/>
+              <a:t> com o </a:t>
+            </a:r>
+            <a:r>
+              <a:rPr lang="en-US" dirty="0" err="1" smtClean="0"/>
+              <a:t>modificador</a:t>
+            </a:r>
+            <a:r>
+              <a:rPr lang="en-US" dirty="0" smtClean="0"/>
+              <a:t> </a:t>
+            </a:r>
+            <a:r>
+              <a:rPr lang="en-US" b="1" dirty="0" smtClean="0"/>
+              <a:t>final</a:t>
+            </a:r>
+            <a:r>
+              <a:rPr lang="en-US" dirty="0" smtClean="0"/>
+              <a:t> </a:t>
+            </a:r>
+            <a:r>
+              <a:rPr lang="en-US" dirty="0" err="1" smtClean="0"/>
+              <a:t>não</a:t>
+            </a:r>
+            <a:r>
+              <a:rPr lang="en-US" dirty="0" smtClean="0"/>
+              <a:t> </a:t>
+            </a:r>
+            <a:r>
+              <a:rPr lang="en-US" dirty="0" err="1" smtClean="0"/>
+              <a:t>pode</a:t>
+            </a:r>
+            <a:r>
+              <a:rPr lang="en-US" dirty="0" smtClean="0"/>
+              <a:t> </a:t>
+            </a:r>
+            <a:r>
+              <a:rPr lang="en-US" dirty="0" err="1" smtClean="0"/>
+              <a:t>ter</a:t>
+            </a:r>
+            <a:r>
+              <a:rPr lang="en-US" dirty="0" smtClean="0"/>
+              <a:t> a </a:t>
+            </a:r>
+            <a:r>
+              <a:rPr lang="en-US" dirty="0" err="1" smtClean="0"/>
+              <a:t>sua</a:t>
+            </a:r>
+            <a:r>
+              <a:rPr lang="en-US" dirty="0" smtClean="0"/>
+              <a:t> </a:t>
+            </a:r>
+            <a:r>
+              <a:rPr lang="en-US" dirty="0" err="1" smtClean="0"/>
+              <a:t>definição</a:t>
+            </a:r>
+            <a:r>
+              <a:rPr lang="en-US" dirty="0" smtClean="0"/>
+              <a:t> </a:t>
+            </a:r>
+            <a:r>
+              <a:rPr lang="en-US" dirty="0" err="1" smtClean="0"/>
+              <a:t>modificada</a:t>
+            </a:r>
+            <a:r>
+              <a:rPr lang="en-US" dirty="0" smtClean="0"/>
+              <a:t> </a:t>
+            </a:r>
+            <a:r>
+              <a:rPr lang="en-US" dirty="0" err="1" smtClean="0"/>
+              <a:t>por</a:t>
+            </a:r>
+            <a:r>
+              <a:rPr lang="en-US" dirty="0" smtClean="0"/>
+              <a:t> </a:t>
+            </a:r>
+            <a:r>
+              <a:rPr lang="en-US" dirty="0" err="1" smtClean="0"/>
+              <a:t>nenhum</a:t>
+            </a:r>
+            <a:r>
+              <a:rPr lang="en-US" dirty="0" smtClean="0"/>
+              <a:t> </a:t>
+            </a:r>
+            <a:r>
+              <a:rPr lang="en-US" dirty="0" err="1" smtClean="0"/>
+              <a:t>objeto</a:t>
+            </a:r>
+            <a:r>
+              <a:rPr lang="en-US" dirty="0" smtClean="0"/>
+              <a:t>, </a:t>
+            </a:r>
+            <a:r>
+              <a:rPr lang="en-US" dirty="0" err="1" smtClean="0"/>
+              <a:t>nem</a:t>
+            </a:r>
+            <a:r>
+              <a:rPr lang="en-US" dirty="0" smtClean="0"/>
+              <a:t> </a:t>
+            </a:r>
+            <a:r>
+              <a:rPr lang="en-US" dirty="0" err="1" smtClean="0"/>
+              <a:t>mesmo</a:t>
+            </a:r>
+            <a:r>
+              <a:rPr lang="en-US" dirty="0" smtClean="0"/>
+              <a:t> um </a:t>
+            </a:r>
+            <a:r>
+              <a:rPr lang="en-US" dirty="0" err="1" smtClean="0"/>
+              <a:t>objeto</a:t>
+            </a:r>
+            <a:r>
+              <a:rPr lang="en-US" dirty="0" smtClean="0"/>
+              <a:t> da </a:t>
+            </a:r>
+            <a:r>
+              <a:rPr lang="en-US" dirty="0" err="1" smtClean="0"/>
+              <a:t>classe</a:t>
+            </a:r>
+            <a:r>
+              <a:rPr lang="en-US" dirty="0" smtClean="0"/>
+              <a:t> </a:t>
+            </a:r>
+            <a:r>
+              <a:rPr lang="en-US" dirty="0" err="1" smtClean="0"/>
+              <a:t>onde</a:t>
+            </a:r>
+            <a:r>
+              <a:rPr lang="en-US" dirty="0" smtClean="0"/>
+              <a:t> o </a:t>
+            </a:r>
+            <a:r>
+              <a:rPr lang="en-US" dirty="0" err="1" smtClean="0"/>
+              <a:t>membro</a:t>
+            </a:r>
+            <a:r>
+              <a:rPr lang="en-US" dirty="0" smtClean="0"/>
+              <a:t> </a:t>
+            </a:r>
+            <a:r>
+              <a:rPr lang="en-US" dirty="0" err="1" smtClean="0"/>
+              <a:t>foi</a:t>
+            </a:r>
+            <a:r>
+              <a:rPr lang="en-US" dirty="0" smtClean="0"/>
+              <a:t> </a:t>
+            </a:r>
+            <a:r>
+              <a:rPr lang="en-US" dirty="0" err="1" smtClean="0"/>
+              <a:t>definido</a:t>
+            </a:r>
+            <a:r>
+              <a:rPr lang="en-US" dirty="0" smtClean="0"/>
+              <a:t>. </a:t>
+            </a:r>
+            <a:r>
+              <a:rPr lang="en-US" dirty="0" err="1" smtClean="0"/>
+              <a:t>Dizemos</a:t>
+            </a:r>
+            <a:r>
+              <a:rPr lang="en-US" dirty="0" smtClean="0"/>
+              <a:t> </a:t>
+            </a:r>
+            <a:r>
+              <a:rPr lang="en-US" dirty="0" err="1" smtClean="0"/>
+              <a:t>que</a:t>
+            </a:r>
+            <a:r>
+              <a:rPr lang="en-US" dirty="0" smtClean="0"/>
+              <a:t> um </a:t>
+            </a:r>
+            <a:r>
+              <a:rPr lang="en-US" dirty="0" err="1" smtClean="0"/>
+              <a:t>membro</a:t>
+            </a:r>
+            <a:r>
+              <a:rPr lang="en-US" dirty="0" smtClean="0"/>
+              <a:t> final </a:t>
+            </a:r>
+            <a:r>
+              <a:rPr lang="en-US" dirty="0" err="1" smtClean="0"/>
+              <a:t>é</a:t>
+            </a:r>
+            <a:r>
+              <a:rPr lang="en-US" dirty="0" smtClean="0"/>
+              <a:t> </a:t>
+            </a:r>
+            <a:r>
+              <a:rPr lang="en-US" dirty="0" err="1" smtClean="0"/>
+              <a:t>uma</a:t>
+            </a:r>
+            <a:r>
+              <a:rPr lang="en-US" dirty="0" smtClean="0"/>
+              <a:t> </a:t>
+            </a:r>
+            <a:r>
+              <a:rPr lang="en-US" dirty="0" err="1" smtClean="0"/>
+              <a:t>constante</a:t>
+            </a:r>
+            <a:r>
+              <a:rPr lang="en-US" dirty="0" smtClean="0"/>
+              <a:t>. No </a:t>
+            </a:r>
+            <a:r>
+              <a:rPr lang="en-US" dirty="0" err="1" smtClean="0"/>
+              <a:t>caso</a:t>
+            </a:r>
+            <a:r>
+              <a:rPr lang="en-US" dirty="0" smtClean="0"/>
+              <a:t> de </a:t>
+            </a:r>
+            <a:r>
+              <a:rPr lang="en-US" dirty="0" err="1" smtClean="0"/>
+              <a:t>herança</a:t>
+            </a:r>
+            <a:r>
+              <a:rPr lang="en-US" dirty="0" smtClean="0"/>
+              <a:t>, </a:t>
+            </a:r>
+            <a:r>
+              <a:rPr lang="en-US" dirty="0" err="1" smtClean="0"/>
+              <a:t>uma</a:t>
+            </a:r>
+            <a:r>
+              <a:rPr lang="en-US" dirty="0" smtClean="0"/>
+              <a:t> </a:t>
+            </a:r>
+            <a:r>
+              <a:rPr lang="en-US" dirty="0" err="1" smtClean="0"/>
+              <a:t>subclasse</a:t>
+            </a:r>
+            <a:r>
+              <a:rPr lang="en-US" dirty="0" smtClean="0"/>
+              <a:t> </a:t>
+            </a:r>
+            <a:r>
+              <a:rPr lang="en-US" dirty="0" err="1" smtClean="0"/>
+              <a:t>não</a:t>
+            </a:r>
+            <a:r>
+              <a:rPr lang="en-US" dirty="0" smtClean="0"/>
+              <a:t> </a:t>
+            </a:r>
+            <a:r>
+              <a:rPr lang="en-US" dirty="0" err="1" smtClean="0"/>
+              <a:t>pode</a:t>
+            </a:r>
+            <a:r>
+              <a:rPr lang="en-US" dirty="0" smtClean="0"/>
+              <a:t> </a:t>
+            </a:r>
+            <a:r>
+              <a:rPr lang="en-US" dirty="0" err="1" smtClean="0"/>
+              <a:t>sobrecarregar</a:t>
+            </a:r>
+            <a:r>
+              <a:rPr lang="en-US" dirty="0" smtClean="0"/>
+              <a:t> um </a:t>
+            </a:r>
+            <a:r>
+              <a:rPr lang="en-US" dirty="0" err="1" smtClean="0"/>
+              <a:t>método</a:t>
+            </a:r>
+            <a:r>
+              <a:rPr lang="en-US" dirty="0" smtClean="0"/>
+              <a:t> </a:t>
+            </a:r>
+            <a:r>
+              <a:rPr lang="en-US" dirty="0" err="1" smtClean="0"/>
+              <a:t>declarado</a:t>
+            </a:r>
+            <a:r>
+              <a:rPr lang="en-US" dirty="0" smtClean="0"/>
+              <a:t> </a:t>
+            </a:r>
+            <a:r>
+              <a:rPr lang="en-US" dirty="0" err="1" smtClean="0"/>
+              <a:t>como</a:t>
+            </a:r>
+            <a:r>
+              <a:rPr lang="en-US" dirty="0" smtClean="0"/>
+              <a:t> final </a:t>
+            </a:r>
+            <a:r>
+              <a:rPr lang="en-US" dirty="0" err="1" smtClean="0"/>
+              <a:t>na</a:t>
+            </a:r>
+            <a:r>
+              <a:rPr lang="en-US" dirty="0" smtClean="0"/>
+              <a:t> </a:t>
+            </a:r>
+            <a:r>
+              <a:rPr lang="en-US" dirty="0" err="1" smtClean="0"/>
+              <a:t>superclasse</a:t>
+            </a:r>
+            <a:r>
+              <a:rPr lang="en-US" dirty="0" smtClean="0"/>
+              <a:t>.</a:t>
+            </a:r>
+            <a:endParaRPr lang="en-US" dirty="0"/>
+          </a:p>
+        </p:txBody>
+      </p:sp>
+    </p:spTree>
+    <p:extLst>
+      <p:ext uri="{BB962C8B-B14F-4D97-AF65-F5344CB8AC3E}">
+        <p14:creationId xmlns:p14="http://schemas.microsoft.com/office/powerpoint/2010/main" val="260025835"/>
+      </p:ext>
+    </p:extLst>
+  </p:cSld>
+  <p:clrMapOvr>
+    <a:masterClrMapping/>
+  </p:clrMapOvr>
 </p:sld>
 </file>
 
@@ -11775,13 +15023,8 @@
             </a:r>
             <a:r>
               <a:rPr lang="en-US" dirty="0" smtClean="0"/>
-              <a:t> </a:t>
-            </a:r>
-            <a:r>
-              <a:rPr lang="en-US" dirty="0" smtClean="0"/>
-              <a:t>dados?</a:t>
-            </a:r>
-            <a:endParaRPr lang="en-US" dirty="0" smtClean="0"/>
+              <a:t> dados?</a:t>
+            </a:r>
           </a:p>
           <a:p>
             <a:r>

</xml_diff>